<commit_message>
organização dos arquivos 2 Readme e FLuxograma
</commit_message>
<xml_diff>
--- a/docs/Notifications App.pptx
+++ b/docs/Notifications App.pptx
@@ -5,17 +5,16 @@
     <p:sldMasterId id="2147483672" r:id="rId4"/>
   </p:sldMasterIdLst>
   <p:notesMasterIdLst>
-    <p:notesMasterId r:id="rId10"/>
+    <p:notesMasterId r:id="rId9"/>
   </p:notesMasterIdLst>
   <p:handoutMasterIdLst>
-    <p:handoutMasterId r:id="rId11"/>
+    <p:handoutMasterId r:id="rId10"/>
   </p:handoutMasterIdLst>
   <p:sldIdLst>
     <p:sldId id="256" r:id="rId5"/>
     <p:sldId id="263" r:id="rId6"/>
-    <p:sldId id="264" r:id="rId7"/>
-    <p:sldId id="257" r:id="rId8"/>
-    <p:sldId id="260" r:id="rId9"/>
+    <p:sldId id="257" r:id="rId7"/>
+    <p:sldId id="260" r:id="rId8"/>
   </p:sldIdLst>
   <p:sldSz cx="12192000" cy="6858000"/>
   <p:notesSz cx="6858000" cy="9144000"/>
@@ -812,7 +811,7 @@
           <a:p>
             <a:fld id="{C6B3AB32-59DF-41F1-9618-EDFBF5049629}" type="slidenum">
               <a:rPr lang="en-US" smtClean="0"/>
-              <a:t>5</a:t>
+              <a:t>4</a:t>
             </a:fld>
             <a:endParaRPr lang="en-US" dirty="0"/>
           </a:p>
@@ -5889,823 +5888,6 @@
           <a:chExt cx="0" cy="0"/>
         </a:xfrm>
       </p:grpSpPr>
-      <p:grpSp>
-        <p:nvGrpSpPr>
-          <p:cNvPr id="23" name="Agrupar 22">
-            <a:extLst>
-              <a:ext uri="{FF2B5EF4-FFF2-40B4-BE49-F238E27FC236}">
-                <a16:creationId xmlns:a16="http://schemas.microsoft.com/office/drawing/2014/main" id="{46A87F0D-9716-22A5-3DED-2DE353A48714}"/>
-              </a:ext>
-            </a:extLst>
-          </p:cNvPr>
-          <p:cNvGrpSpPr/>
-          <p:nvPr/>
-        </p:nvGrpSpPr>
-        <p:grpSpPr>
-          <a:xfrm>
-            <a:off x="241581" y="1406013"/>
-            <a:ext cx="6129492" cy="5150234"/>
-            <a:chOff x="241581" y="1406013"/>
-            <a:chExt cx="6129492" cy="5150234"/>
-          </a:xfrm>
-        </p:grpSpPr>
-        <p:pic>
-          <p:nvPicPr>
-            <p:cNvPr id="1028" name="Picture 4" descr="Docker: Compose. Explorando o Docker Compose | by Hugo Habbema | Medium">
-              <a:extLst>
-                <a:ext uri="{FF2B5EF4-FFF2-40B4-BE49-F238E27FC236}">
-                  <a16:creationId xmlns:a16="http://schemas.microsoft.com/office/drawing/2014/main" id="{9C323E3E-7DAD-502B-1036-4DB57A9ACF12}"/>
-                </a:ext>
-              </a:extLst>
-            </p:cNvPr>
-            <p:cNvPicPr>
-              <a:picLocks noChangeAspect="1" noChangeArrowheads="1"/>
-            </p:cNvPicPr>
-            <p:nvPr/>
-          </p:nvPicPr>
-          <p:blipFill>
-            <a:blip r:embed="rId2">
-              <a:extLst>
-                <a:ext uri="{28A0092B-C50C-407E-A947-70E740481C1C}">
-                  <a14:useLocalDpi xmlns:a14="http://schemas.microsoft.com/office/drawing/2010/main" val="0"/>
-                </a:ext>
-              </a:extLst>
-            </a:blip>
-            <a:srcRect/>
-            <a:stretch>
-              <a:fillRect/>
-            </a:stretch>
-          </p:blipFill>
-          <p:spPr bwMode="auto">
-            <a:xfrm>
-              <a:off x="1328657" y="1701410"/>
-              <a:ext cx="3842782" cy="1838368"/>
-            </a:xfrm>
-            <a:prstGeom prst="rect">
-              <a:avLst/>
-            </a:prstGeom>
-            <a:noFill/>
-            <a:extLst>
-              <a:ext uri="{909E8E84-426E-40DD-AFC4-6F175D3DCCD1}">
-                <a14:hiddenFill xmlns:a14="http://schemas.microsoft.com/office/drawing/2010/main">
-                  <a:solidFill>
-                    <a:srgbClr val="FFFFFF"/>
-                  </a:solidFill>
-                </a14:hiddenFill>
-              </a:ext>
-            </a:extLst>
-          </p:spPr>
-        </p:pic>
-        <p:sp>
-          <p:nvSpPr>
-            <p:cNvPr id="18" name="Fluxograma: Processo 17">
-              <a:extLst>
-                <a:ext uri="{FF2B5EF4-FFF2-40B4-BE49-F238E27FC236}">
-                  <a16:creationId xmlns:a16="http://schemas.microsoft.com/office/drawing/2014/main" id="{B16CE1D0-C639-5745-4A26-02F2E2038C5D}"/>
-                </a:ext>
-              </a:extLst>
-            </p:cNvPr>
-            <p:cNvSpPr/>
-            <p:nvPr/>
-          </p:nvSpPr>
-          <p:spPr>
-            <a:xfrm>
-              <a:off x="241581" y="1406013"/>
-              <a:ext cx="6129492" cy="5150234"/>
-            </a:xfrm>
-            <a:prstGeom prst="flowChartProcess">
-              <a:avLst/>
-            </a:prstGeom>
-            <a:noFill/>
-          </p:spPr>
-          <p:style>
-            <a:lnRef idx="2">
-              <a:schemeClr val="accent1">
-                <a:shade val="15000"/>
-              </a:schemeClr>
-            </a:lnRef>
-            <a:fillRef idx="1">
-              <a:schemeClr val="accent1"/>
-            </a:fillRef>
-            <a:effectRef idx="0">
-              <a:schemeClr val="accent1"/>
-            </a:effectRef>
-            <a:fontRef idx="minor">
-              <a:schemeClr val="lt1"/>
-            </a:fontRef>
-          </p:style>
-          <p:txBody>
-            <a:bodyPr rtlCol="0" anchor="ctr"/>
-            <a:lstStyle/>
-            <a:p>
-              <a:pPr algn="ctr"/>
-              <a:endParaRPr lang="en-US" dirty="0"/>
-            </a:p>
-          </p:txBody>
-        </p:sp>
-      </p:grpSp>
-      <p:grpSp>
-        <p:nvGrpSpPr>
-          <p:cNvPr id="16" name="Agrupar 15">
-            <a:extLst>
-              <a:ext uri="{FF2B5EF4-FFF2-40B4-BE49-F238E27FC236}">
-                <a16:creationId xmlns:a16="http://schemas.microsoft.com/office/drawing/2014/main" id="{7D975E43-4499-7AF3-8C4B-42DEC69DF6D0}"/>
-              </a:ext>
-            </a:extLst>
-          </p:cNvPr>
-          <p:cNvGrpSpPr/>
-          <p:nvPr/>
-        </p:nvGrpSpPr>
-        <p:grpSpPr>
-          <a:xfrm>
-            <a:off x="3587722" y="3878380"/>
-            <a:ext cx="2392389" cy="2251586"/>
-            <a:chOff x="3458380" y="1680431"/>
-            <a:chExt cx="2392389" cy="2251586"/>
-          </a:xfrm>
-        </p:grpSpPr>
-        <p:pic>
-          <p:nvPicPr>
-            <p:cNvPr id="14" name="Picture 2" descr="O que é Docker? | Mundo Docker">
-              <a:extLst>
-                <a:ext uri="{FF2B5EF4-FFF2-40B4-BE49-F238E27FC236}">
-                  <a16:creationId xmlns:a16="http://schemas.microsoft.com/office/drawing/2014/main" id="{4BD67393-8780-190B-7953-502E44344C75}"/>
-                </a:ext>
-              </a:extLst>
-            </p:cNvPr>
-            <p:cNvPicPr>
-              <a:picLocks noChangeAspect="1" noChangeArrowheads="1"/>
-            </p:cNvPicPr>
-            <p:nvPr/>
-          </p:nvPicPr>
-          <p:blipFill>
-            <a:blip r:embed="rId3">
-              <a:extLst>
-                <a:ext uri="{28A0092B-C50C-407E-A947-70E740481C1C}">
-                  <a14:useLocalDpi xmlns:a14="http://schemas.microsoft.com/office/drawing/2010/main" val="0"/>
-                </a:ext>
-              </a:extLst>
-            </a:blip>
-            <a:srcRect/>
-            <a:stretch>
-              <a:fillRect/>
-            </a:stretch>
-          </p:blipFill>
-          <p:spPr bwMode="auto">
-            <a:xfrm>
-              <a:off x="4244045" y="1703586"/>
-              <a:ext cx="852488" cy="726193"/>
-            </a:xfrm>
-            <a:prstGeom prst="rect">
-              <a:avLst/>
-            </a:prstGeom>
-            <a:noFill/>
-            <a:extLst>
-              <a:ext uri="{909E8E84-426E-40DD-AFC4-6F175D3DCCD1}">
-                <a14:hiddenFill xmlns:a14="http://schemas.microsoft.com/office/drawing/2010/main">
-                  <a:solidFill>
-                    <a:srgbClr val="FFFFFF"/>
-                  </a:solidFill>
-                </a14:hiddenFill>
-              </a:ext>
-            </a:extLst>
-          </p:spPr>
-        </p:pic>
-        <p:sp>
-          <p:nvSpPr>
-            <p:cNvPr id="15" name="Fluxograma: Processo 14">
-              <a:extLst>
-                <a:ext uri="{FF2B5EF4-FFF2-40B4-BE49-F238E27FC236}">
-                  <a16:creationId xmlns:a16="http://schemas.microsoft.com/office/drawing/2014/main" id="{95484B4E-0156-5A69-7FA1-F2B4A38A0D6A}"/>
-                </a:ext>
-              </a:extLst>
-            </p:cNvPr>
-            <p:cNvSpPr/>
-            <p:nvPr/>
-          </p:nvSpPr>
-          <p:spPr>
-            <a:xfrm>
-              <a:off x="3458380" y="1680431"/>
-              <a:ext cx="2392389" cy="2251586"/>
-            </a:xfrm>
-            <a:prstGeom prst="flowChartProcess">
-              <a:avLst/>
-            </a:prstGeom>
-            <a:noFill/>
-          </p:spPr>
-          <p:style>
-            <a:lnRef idx="2">
-              <a:schemeClr val="accent1">
-                <a:shade val="15000"/>
-              </a:schemeClr>
-            </a:lnRef>
-            <a:fillRef idx="1">
-              <a:schemeClr val="accent1"/>
-            </a:fillRef>
-            <a:effectRef idx="0">
-              <a:schemeClr val="accent1"/>
-            </a:effectRef>
-            <a:fontRef idx="minor">
-              <a:schemeClr val="lt1"/>
-            </a:fontRef>
-          </p:style>
-          <p:txBody>
-            <a:bodyPr rtlCol="0" anchor="ctr"/>
-            <a:lstStyle/>
-            <a:p>
-              <a:pPr algn="r"/>
-              <a:endParaRPr lang="en-US" dirty="0"/>
-            </a:p>
-          </p:txBody>
-        </p:sp>
-        <p:grpSp>
-          <p:nvGrpSpPr>
-            <p:cNvPr id="11" name="Agrupar 10">
-              <a:extLst>
-                <a:ext uri="{FF2B5EF4-FFF2-40B4-BE49-F238E27FC236}">
-                  <a16:creationId xmlns:a16="http://schemas.microsoft.com/office/drawing/2014/main" id="{6D53ACF8-42AC-FFF7-78B1-2412F0906CFC}"/>
-                </a:ext>
-              </a:extLst>
-            </p:cNvPr>
-            <p:cNvGrpSpPr/>
-            <p:nvPr/>
-          </p:nvGrpSpPr>
-          <p:grpSpPr>
-            <a:xfrm>
-              <a:off x="3489477" y="2398321"/>
-              <a:ext cx="1170035" cy="1487287"/>
-              <a:chOff x="3623919" y="1861444"/>
-              <a:chExt cx="1170035" cy="1487287"/>
-            </a:xfrm>
-          </p:grpSpPr>
-          <p:sp>
-            <p:nvSpPr>
-              <p:cNvPr id="5" name="Fluxograma: Disco Magnético 4">
-                <a:extLst>
-                  <a:ext uri="{FF2B5EF4-FFF2-40B4-BE49-F238E27FC236}">
-                    <a16:creationId xmlns:a16="http://schemas.microsoft.com/office/drawing/2014/main" id="{D3D9848D-C641-CC3C-148E-79B5B8B0EEA5}"/>
-                  </a:ext>
-                </a:extLst>
-              </p:cNvPr>
-              <p:cNvSpPr/>
-              <p:nvPr/>
-            </p:nvSpPr>
-            <p:spPr>
-              <a:xfrm>
-                <a:off x="3623919" y="1861444"/>
-                <a:ext cx="1170035" cy="1487287"/>
-              </a:xfrm>
-              <a:prstGeom prst="flowChartMagneticDisk">
-                <a:avLst/>
-              </a:prstGeom>
-              <a:solidFill>
-                <a:schemeClr val="bg1"/>
-              </a:solidFill>
-              <a:ln>
-                <a:solidFill>
-                  <a:schemeClr val="tx1"/>
-                </a:solidFill>
-              </a:ln>
-            </p:spPr>
-            <p:style>
-              <a:lnRef idx="2">
-                <a:schemeClr val="accent1">
-                  <a:shade val="15000"/>
-                </a:schemeClr>
-              </a:lnRef>
-              <a:fillRef idx="1">
-                <a:schemeClr val="accent1"/>
-              </a:fillRef>
-              <a:effectRef idx="0">
-                <a:schemeClr val="accent1"/>
-              </a:effectRef>
-              <a:fontRef idx="minor">
-                <a:schemeClr val="lt1"/>
-              </a:fontRef>
-            </p:style>
-            <p:txBody>
-              <a:bodyPr rtlCol="0" anchor="ctr"/>
-              <a:lstStyle/>
-              <a:p>
-                <a:pPr algn="r"/>
-                <a:endParaRPr lang="en-US"/>
-              </a:p>
-            </p:txBody>
-          </p:sp>
-          <p:pic>
-            <p:nvPicPr>
-              <p:cNvPr id="3" name="Picture 4" descr="How to get started with MongoDB in 10 minutes | by Navindu Jayatilake |  We've moved to freeCodeCamp.org/news | Medium">
-                <a:extLst>
-                  <a:ext uri="{FF2B5EF4-FFF2-40B4-BE49-F238E27FC236}">
-                    <a16:creationId xmlns:a16="http://schemas.microsoft.com/office/drawing/2014/main" id="{BBBE8440-205D-F4B0-FEF3-450B42DEB26F}"/>
-                  </a:ext>
-                </a:extLst>
-              </p:cNvPr>
-              <p:cNvPicPr>
-                <a:picLocks noChangeAspect="1" noChangeArrowheads="1"/>
-              </p:cNvPicPr>
-              <p:nvPr/>
-            </p:nvPicPr>
-            <p:blipFill>
-              <a:blip r:embed="rId4">
-                <a:extLst>
-                  <a:ext uri="{28A0092B-C50C-407E-A947-70E740481C1C}">
-                    <a14:useLocalDpi xmlns:a14="http://schemas.microsoft.com/office/drawing/2010/main" val="0"/>
-                  </a:ext>
-                </a:extLst>
-              </a:blip>
-              <a:srcRect/>
-              <a:stretch>
-                <a:fillRect/>
-              </a:stretch>
-            </p:blipFill>
-            <p:spPr bwMode="auto">
-              <a:xfrm>
-                <a:off x="3792329" y="2390204"/>
-                <a:ext cx="849407" cy="849407"/>
-              </a:xfrm>
-              <a:prstGeom prst="rect">
-                <a:avLst/>
-              </a:prstGeom>
-              <a:noFill/>
-              <a:extLst>
-                <a:ext uri="{909E8E84-426E-40DD-AFC4-6F175D3DCCD1}">
-                  <a14:hiddenFill xmlns:a14="http://schemas.microsoft.com/office/drawing/2010/main">
-                    <a:solidFill>
-                      <a:srgbClr val="FFFFFF"/>
-                    </a:solidFill>
-                  </a14:hiddenFill>
-                </a:ext>
-              </a:extLst>
-            </p:spPr>
-          </p:pic>
-        </p:grpSp>
-      </p:grpSp>
-      <p:grpSp>
-        <p:nvGrpSpPr>
-          <p:cNvPr id="8" name="Agrupar 7">
-            <a:extLst>
-              <a:ext uri="{FF2B5EF4-FFF2-40B4-BE49-F238E27FC236}">
-                <a16:creationId xmlns:a16="http://schemas.microsoft.com/office/drawing/2014/main" id="{E7AAF72E-25BE-4463-912C-1034D2C862E3}"/>
-              </a:ext>
-            </a:extLst>
-          </p:cNvPr>
-          <p:cNvGrpSpPr/>
-          <p:nvPr/>
-        </p:nvGrpSpPr>
-        <p:grpSpPr>
-          <a:xfrm>
-            <a:off x="596614" y="3872056"/>
-            <a:ext cx="2580482" cy="2292474"/>
-            <a:chOff x="537622" y="1630303"/>
-            <a:chExt cx="2580482" cy="2292474"/>
-          </a:xfrm>
-        </p:grpSpPr>
-        <p:sp>
-          <p:nvSpPr>
-            <p:cNvPr id="13" name="Fluxograma: Processo 12">
-              <a:extLst>
-                <a:ext uri="{FF2B5EF4-FFF2-40B4-BE49-F238E27FC236}">
-                  <a16:creationId xmlns:a16="http://schemas.microsoft.com/office/drawing/2014/main" id="{4B4F2020-3099-D763-863E-CD6ED6E751D0}"/>
-                </a:ext>
-              </a:extLst>
-            </p:cNvPr>
-            <p:cNvSpPr/>
-            <p:nvPr/>
-          </p:nvSpPr>
-          <p:spPr>
-            <a:xfrm>
-              <a:off x="537622" y="1630303"/>
-              <a:ext cx="2580482" cy="2292474"/>
-            </a:xfrm>
-            <a:prstGeom prst="flowChartProcess">
-              <a:avLst/>
-            </a:prstGeom>
-            <a:noFill/>
-          </p:spPr>
-          <p:style>
-            <a:lnRef idx="2">
-              <a:schemeClr val="accent1">
-                <a:shade val="15000"/>
-              </a:schemeClr>
-            </a:lnRef>
-            <a:fillRef idx="1">
-              <a:schemeClr val="accent1"/>
-            </a:fillRef>
-            <a:effectRef idx="0">
-              <a:schemeClr val="accent1"/>
-            </a:effectRef>
-            <a:fontRef idx="minor">
-              <a:schemeClr val="lt1"/>
-            </a:fontRef>
-          </p:style>
-          <p:txBody>
-            <a:bodyPr rtlCol="0" anchor="ctr"/>
-            <a:lstStyle/>
-            <a:p>
-              <a:pPr algn="r"/>
-              <a:endParaRPr lang="en-US" dirty="0"/>
-            </a:p>
-          </p:txBody>
-        </p:sp>
-        <p:pic>
-          <p:nvPicPr>
-            <p:cNvPr id="2" name="Picture 2" descr="Logging Incoming Requests in Spring WebFlux | by Dursun KOÇ | Medium">
-              <a:extLst>
-                <a:ext uri="{FF2B5EF4-FFF2-40B4-BE49-F238E27FC236}">
-                  <a16:creationId xmlns:a16="http://schemas.microsoft.com/office/drawing/2014/main" id="{7B8047BB-2733-EFF9-D6C0-F5E17098EE77}"/>
-                </a:ext>
-              </a:extLst>
-            </p:cNvPr>
-            <p:cNvPicPr>
-              <a:picLocks noChangeAspect="1" noChangeArrowheads="1"/>
-            </p:cNvPicPr>
-            <p:nvPr/>
-          </p:nvPicPr>
-          <p:blipFill>
-            <a:blip r:embed="rId5">
-              <a:extLst>
-                <a:ext uri="{28A0092B-C50C-407E-A947-70E740481C1C}">
-                  <a14:useLocalDpi xmlns:a14="http://schemas.microsoft.com/office/drawing/2010/main" val="0"/>
-                </a:ext>
-              </a:extLst>
-            </a:blip>
-            <a:srcRect/>
-            <a:stretch>
-              <a:fillRect/>
-            </a:stretch>
-          </p:blipFill>
-          <p:spPr bwMode="auto">
-            <a:xfrm>
-              <a:off x="576448" y="2275990"/>
-              <a:ext cx="2495450" cy="1410472"/>
-            </a:xfrm>
-            <a:prstGeom prst="rect">
-              <a:avLst/>
-            </a:prstGeom>
-            <a:noFill/>
-            <a:extLst>
-              <a:ext uri="{909E8E84-426E-40DD-AFC4-6F175D3DCCD1}">
-                <a14:hiddenFill xmlns:a14="http://schemas.microsoft.com/office/drawing/2010/main">
-                  <a:solidFill>
-                    <a:srgbClr val="FFFFFF"/>
-                  </a:solidFill>
-                </a14:hiddenFill>
-              </a:ext>
-            </a:extLst>
-          </p:spPr>
-        </p:pic>
-        <p:sp>
-          <p:nvSpPr>
-            <p:cNvPr id="6" name="CaixaDeTexto 5">
-              <a:extLst>
-                <a:ext uri="{FF2B5EF4-FFF2-40B4-BE49-F238E27FC236}">
-                  <a16:creationId xmlns:a16="http://schemas.microsoft.com/office/drawing/2014/main" id="{A0D6F568-8C9F-2319-C522-ED70F9C81666}"/>
-                </a:ext>
-              </a:extLst>
-            </p:cNvPr>
-            <p:cNvSpPr txBox="1"/>
-            <p:nvPr/>
-          </p:nvSpPr>
-          <p:spPr>
-            <a:xfrm>
-              <a:off x="691724" y="3608609"/>
-              <a:ext cx="2264898" cy="276999"/>
-            </a:xfrm>
-            <a:prstGeom prst="rect">
-              <a:avLst/>
-            </a:prstGeom>
-            <a:noFill/>
-          </p:spPr>
-          <p:txBody>
-            <a:bodyPr wrap="square" rtlCol="0">
-              <a:spAutoFit/>
-            </a:bodyPr>
-            <a:lstStyle/>
-            <a:p>
-              <a:r>
-                <a:rPr lang="en-US" sz="1200" dirty="0"/>
-                <a:t>notifications-reative-webflux.jar</a:t>
-              </a:r>
-            </a:p>
-          </p:txBody>
-        </p:sp>
-        <p:pic>
-          <p:nvPicPr>
-            <p:cNvPr id="1026" name="Picture 2" descr="O que é Docker? | Mundo Docker">
-              <a:extLst>
-                <a:ext uri="{FF2B5EF4-FFF2-40B4-BE49-F238E27FC236}">
-                  <a16:creationId xmlns:a16="http://schemas.microsoft.com/office/drawing/2014/main" id="{4BF9830D-4AEE-74D1-094E-5CC538E461ED}"/>
-                </a:ext>
-              </a:extLst>
-            </p:cNvPr>
-            <p:cNvPicPr>
-              <a:picLocks noChangeAspect="1" noChangeArrowheads="1"/>
-            </p:cNvPicPr>
-            <p:nvPr/>
-          </p:nvPicPr>
-          <p:blipFill>
-            <a:blip r:embed="rId3">
-              <a:extLst>
-                <a:ext uri="{28A0092B-C50C-407E-A947-70E740481C1C}">
-                  <a14:useLocalDpi xmlns:a14="http://schemas.microsoft.com/office/drawing/2010/main" val="0"/>
-                </a:ext>
-              </a:extLst>
-            </a:blip>
-            <a:srcRect/>
-            <a:stretch>
-              <a:fillRect/>
-            </a:stretch>
-          </p:blipFill>
-          <p:spPr bwMode="auto">
-            <a:xfrm>
-              <a:off x="1579045" y="1713747"/>
-              <a:ext cx="852488" cy="726193"/>
-            </a:xfrm>
-            <a:prstGeom prst="rect">
-              <a:avLst/>
-            </a:prstGeom>
-            <a:noFill/>
-            <a:extLst>
-              <a:ext uri="{909E8E84-426E-40DD-AFC4-6F175D3DCCD1}">
-                <a14:hiddenFill xmlns:a14="http://schemas.microsoft.com/office/drawing/2010/main">
-                  <a:solidFill>
-                    <a:srgbClr val="FFFFFF"/>
-                  </a:solidFill>
-                </a14:hiddenFill>
-              </a:ext>
-            </a:extLst>
-          </p:spPr>
-        </p:pic>
-      </p:grpSp>
-      <p:sp>
-        <p:nvSpPr>
-          <p:cNvPr id="4" name="CaixaDeTexto 3">
-            <a:extLst>
-              <a:ext uri="{FF2B5EF4-FFF2-40B4-BE49-F238E27FC236}">
-                <a16:creationId xmlns:a16="http://schemas.microsoft.com/office/drawing/2014/main" id="{DB1FC130-641E-2666-F459-F3712E3FF6C8}"/>
-              </a:ext>
-            </a:extLst>
-          </p:cNvPr>
-          <p:cNvSpPr txBox="1"/>
-          <p:nvPr/>
-        </p:nvSpPr>
-        <p:spPr>
-          <a:xfrm>
-            <a:off x="6606752" y="757144"/>
-            <a:ext cx="5211620" cy="2308324"/>
-          </a:xfrm>
-          <a:prstGeom prst="rect">
-            <a:avLst/>
-          </a:prstGeom>
-          <a:noFill/>
-        </p:spPr>
-        <p:txBody>
-          <a:bodyPr wrap="square" rtlCol="0">
-            <a:spAutoFit/>
-          </a:bodyPr>
-          <a:lstStyle/>
-          <a:p>
-            <a:r>
-              <a:rPr lang="en-US" sz="2400" b="1" dirty="0" err="1"/>
-              <a:t>Projeto</a:t>
-            </a:r>
-            <a:r>
-              <a:rPr lang="en-US" sz="2400" b="1" dirty="0"/>
-              <a:t> 2</a:t>
-            </a:r>
-          </a:p>
-          <a:p>
-            <a:pPr marL="171450" indent="-171450">
-              <a:buFont typeface="Arial" panose="020B0604020202020204" pitchFamily="34" charset="0"/>
-              <a:buChar char="•"/>
-            </a:pPr>
-            <a:r>
-              <a:rPr lang="en-US" sz="2000" dirty="0"/>
-              <a:t>Spring </a:t>
-            </a:r>
-            <a:r>
-              <a:rPr lang="en-US" sz="2000" dirty="0" err="1"/>
-              <a:t>WebFlux</a:t>
-            </a:r>
-            <a:r>
-              <a:rPr lang="en-US" sz="2000" dirty="0"/>
-              <a:t> </a:t>
-            </a:r>
-            <a:r>
-              <a:rPr lang="en-US" sz="2000" dirty="0" err="1"/>
-              <a:t>Reative</a:t>
-            </a:r>
-            <a:r>
-              <a:rPr lang="en-US" sz="2000" dirty="0"/>
-              <a:t> e </a:t>
-            </a:r>
-            <a:r>
-              <a:rPr lang="en-US" sz="2000" dirty="0" err="1"/>
-              <a:t>nao</a:t>
-            </a:r>
-            <a:r>
-              <a:rPr lang="en-US" sz="2000" dirty="0"/>
-              <a:t> </a:t>
-            </a:r>
-            <a:r>
-              <a:rPr lang="en-US" sz="2000" dirty="0" err="1"/>
-              <a:t>blocantes</a:t>
-            </a:r>
-            <a:r>
-              <a:rPr lang="en-US" sz="2000" dirty="0"/>
-              <a:t> Api </a:t>
-            </a:r>
-            <a:r>
-              <a:rPr lang="en-US" sz="2000" dirty="0" err="1"/>
-              <a:t>assincronas</a:t>
-            </a:r>
-            <a:endParaRPr lang="en-US" sz="2000" dirty="0"/>
-          </a:p>
-          <a:p>
-            <a:pPr marL="171450" indent="-171450">
-              <a:buFont typeface="Arial" panose="020B0604020202020204" pitchFamily="34" charset="0"/>
-              <a:buChar char="•"/>
-            </a:pPr>
-            <a:r>
-              <a:rPr lang="en-US" sz="2000" dirty="0"/>
-              <a:t>Banco de Dados Nao </a:t>
-            </a:r>
-            <a:r>
-              <a:rPr lang="en-US" sz="2000" dirty="0" err="1"/>
-              <a:t>relacional</a:t>
-            </a:r>
-            <a:r>
-              <a:rPr lang="en-US" sz="2000" dirty="0"/>
-              <a:t> MongoDB</a:t>
-            </a:r>
-          </a:p>
-          <a:p>
-            <a:pPr marL="171450" indent="-171450">
-              <a:buFont typeface="Arial" panose="020B0604020202020204" pitchFamily="34" charset="0"/>
-              <a:buChar char="•"/>
-            </a:pPr>
-            <a:r>
-              <a:rPr lang="en-US" sz="2000" dirty="0"/>
-              <a:t>Docker</a:t>
-            </a:r>
-          </a:p>
-          <a:p>
-            <a:pPr marL="171450" indent="-171450">
-              <a:buFont typeface="Arial" panose="020B0604020202020204" pitchFamily="34" charset="0"/>
-              <a:buChar char="•"/>
-            </a:pPr>
-            <a:r>
-              <a:rPr lang="en-US" sz="2000" dirty="0"/>
-              <a:t>Docker-compose</a:t>
-            </a:r>
-          </a:p>
-          <a:p>
-            <a:endParaRPr lang="en-US" sz="2000" dirty="0"/>
-          </a:p>
-        </p:txBody>
-      </p:sp>
-      <p:grpSp>
-        <p:nvGrpSpPr>
-          <p:cNvPr id="22" name="Agrupar 21">
-            <a:extLst>
-              <a:ext uri="{FF2B5EF4-FFF2-40B4-BE49-F238E27FC236}">
-                <a16:creationId xmlns:a16="http://schemas.microsoft.com/office/drawing/2014/main" id="{CBDF282B-C2D1-EDEC-3A21-322CE04739AC}"/>
-              </a:ext>
-            </a:extLst>
-          </p:cNvPr>
-          <p:cNvGrpSpPr/>
-          <p:nvPr/>
-        </p:nvGrpSpPr>
-        <p:grpSpPr>
-          <a:xfrm>
-            <a:off x="6675425" y="2991354"/>
-            <a:ext cx="5237828" cy="2876857"/>
-            <a:chOff x="6970392" y="2784880"/>
-            <a:chExt cx="5237828" cy="2876857"/>
-          </a:xfrm>
-        </p:grpSpPr>
-        <p:pic>
-          <p:nvPicPr>
-            <p:cNvPr id="9" name="Imagem 8" descr="Interface gráfica do usuário, Aplicativo&#10;&#10;Descrição gerada automaticamente">
-              <a:extLst>
-                <a:ext uri="{FF2B5EF4-FFF2-40B4-BE49-F238E27FC236}">
-                  <a16:creationId xmlns:a16="http://schemas.microsoft.com/office/drawing/2014/main" id="{752FAA9A-829A-AA23-6526-30110B9A2E77}"/>
-                </a:ext>
-              </a:extLst>
-            </p:cNvPr>
-            <p:cNvPicPr>
-              <a:picLocks noChangeAspect="1"/>
-            </p:cNvPicPr>
-            <p:nvPr/>
-          </p:nvPicPr>
-          <p:blipFill>
-            <a:blip r:embed="rId6"/>
-            <a:stretch>
-              <a:fillRect/>
-            </a:stretch>
-          </p:blipFill>
-          <p:spPr>
-            <a:xfrm>
-              <a:off x="9141170" y="2784880"/>
-              <a:ext cx="3067050" cy="1838325"/>
-            </a:xfrm>
-            <a:prstGeom prst="rect">
-              <a:avLst/>
-            </a:prstGeom>
-          </p:spPr>
-        </p:pic>
-        <p:pic>
-          <p:nvPicPr>
-            <p:cNvPr id="12" name="Imagem 11" descr="Interface gráfica do usuário, Aplicativo&#10;&#10;Descrição gerada automaticamente">
-              <a:extLst>
-                <a:ext uri="{FF2B5EF4-FFF2-40B4-BE49-F238E27FC236}">
-                  <a16:creationId xmlns:a16="http://schemas.microsoft.com/office/drawing/2014/main" id="{A5E39D83-9D6F-9453-F382-1F7D0F6DF8FE}"/>
-                </a:ext>
-              </a:extLst>
-            </p:cNvPr>
-            <p:cNvPicPr>
-              <a:picLocks noChangeAspect="1"/>
-            </p:cNvPicPr>
-            <p:nvPr/>
-          </p:nvPicPr>
-          <p:blipFill>
-            <a:blip r:embed="rId7"/>
-            <a:stretch>
-              <a:fillRect/>
-            </a:stretch>
-          </p:blipFill>
-          <p:spPr>
-            <a:xfrm>
-              <a:off x="6970392" y="2784880"/>
-              <a:ext cx="2152650" cy="1866900"/>
-            </a:xfrm>
-            <a:prstGeom prst="rect">
-              <a:avLst/>
-            </a:prstGeom>
-          </p:spPr>
-        </p:pic>
-        <p:pic>
-          <p:nvPicPr>
-            <p:cNvPr id="21" name="Imagem 20" descr="Tabela&#10;&#10;Descrição gerada automaticamente com confiança média">
-              <a:extLst>
-                <a:ext uri="{FF2B5EF4-FFF2-40B4-BE49-F238E27FC236}">
-                  <a16:creationId xmlns:a16="http://schemas.microsoft.com/office/drawing/2014/main" id="{0E27E64E-3D3E-B5E0-3375-191B92F2845D}"/>
-                </a:ext>
-              </a:extLst>
-            </p:cNvPr>
-            <p:cNvPicPr>
-              <a:picLocks noChangeAspect="1"/>
-            </p:cNvPicPr>
-            <p:nvPr/>
-          </p:nvPicPr>
-          <p:blipFill>
-            <a:blip r:embed="rId8"/>
-            <a:stretch>
-              <a:fillRect/>
-            </a:stretch>
-          </p:blipFill>
-          <p:spPr>
-            <a:xfrm>
-              <a:off x="9299938" y="4633037"/>
-              <a:ext cx="1438275" cy="1028700"/>
-            </a:xfrm>
-            <a:prstGeom prst="rect">
-              <a:avLst/>
-            </a:prstGeom>
-          </p:spPr>
-        </p:pic>
-      </p:grpSp>
-    </p:spTree>
-    <p:extLst>
-      <p:ext uri="{BB962C8B-B14F-4D97-AF65-F5344CB8AC3E}">
-        <p14:creationId xmlns:p14="http://schemas.microsoft.com/office/powerpoint/2010/main" val="1178972043"/>
-      </p:ext>
-    </p:extLst>
-  </p:cSld>
-  <p:clrMapOvr>
-    <a:masterClrMapping/>
-  </p:clrMapOvr>
-</p:sld>
-</file>
-
-<file path=ppt/slides/slide4.xml><?xml version="1.0" encoding="utf-8"?>
-<p:sld xmlns:a="http://schemas.openxmlformats.org/drawingml/2006/main" xmlns:r="http://schemas.openxmlformats.org/officeDocument/2006/relationships" xmlns:p="http://schemas.openxmlformats.org/presentationml/2006/main">
-  <p:cSld>
-    <p:spTree>
-      <p:nvGrpSpPr>
-        <p:cNvPr id="1" name=""/>
-        <p:cNvGrpSpPr/>
-        <p:nvPr/>
-      </p:nvGrpSpPr>
-      <p:grpSpPr>
-        <a:xfrm>
-          <a:off x="0" y="0"/>
-          <a:ext cx="0" cy="0"/>
-          <a:chOff x="0" y="0"/>
-          <a:chExt cx="0" cy="0"/>
-        </a:xfrm>
-      </p:grpSpPr>
       <p:sp>
         <p:nvSpPr>
           <p:cNvPr id="2" name="CaixaDeTexto 1">
@@ -7364,7 +6546,7 @@
 </p:sld>
 </file>
 
-<file path=ppt/slides/slide5.xml><?xml version="1.0" encoding="utf-8"?>
+<file path=ppt/slides/slide4.xml><?xml version="1.0" encoding="utf-8"?>
 <p:sld xmlns:a="http://schemas.openxmlformats.org/drawingml/2006/main" xmlns:r="http://schemas.openxmlformats.org/officeDocument/2006/relationships" xmlns:p="http://schemas.openxmlformats.org/presentationml/2006/main">
   <p:cSld>
     <p:bg>
@@ -8749,15 +7931,6 @@
 </file>
 
 <file path=customXml/item2.xml><?xml version="1.0" encoding="utf-8"?>
-<?mso-contentType ?>
-<FormTemplates xmlns="http://schemas.microsoft.com/sharepoint/v3/contenttype/forms">
-  <Display>DocumentLibraryForm</Display>
-  <Edit>DocumentLibraryForm</Edit>
-  <New>DocumentLibraryForm</New>
-</FormTemplates>
-</file>
-
-<file path=customXml/item3.xml><?xml version="1.0" encoding="utf-8"?>
 <ct:contentTypeSchema xmlns:ct="http://schemas.microsoft.com/office/2006/metadata/contentType" xmlns:ma="http://schemas.microsoft.com/office/2006/metadata/properties/metaAttributes" ct:_="" ma:_="" ma:contentTypeName="Document" ma:contentTypeID="0x01010079F111ED35F8CC479449609E8A0923A6" ma:contentTypeVersion="27" ma:contentTypeDescription="Create a new document." ma:contentTypeScope="" ma:versionID="c6f9a84f66a9c8b9a21755b9ffafb945">
   <xsd:schema xmlns:xsd="http://www.w3.org/2001/XMLSchema" xmlns:xs="http://www.w3.org/2001/XMLSchema" xmlns:p="http://schemas.microsoft.com/office/2006/metadata/properties" xmlns:ns1="http://schemas.microsoft.com/sharepoint/v3" xmlns:ns2="71af3243-3dd4-4a8d-8c0d-dd76da1f02a5" xmlns:ns3="16c05727-aa75-4e4a-9b5f-8a80a1165891" xmlns:ns4="230e9df3-be65-4c73-a93b-d1236ebd677e" targetNamespace="http://schemas.microsoft.com/office/2006/metadata/properties" ma:root="true" ma:fieldsID="27df39e3e7036dff54f89ddd5805ce72" ns1:_="" ns2:_="" ns3:_="" ns4:_="">
     <xsd:import namespace="http://schemas.microsoft.com/sharepoint/v3"/>
@@ -9063,6 +8236,15 @@
 </ct:contentTypeSchema>
 </file>
 
+<file path=customXml/item3.xml><?xml version="1.0" encoding="utf-8"?>
+<?mso-contentType ?>
+<FormTemplates xmlns="http://schemas.microsoft.com/sharepoint/v3/contenttype/forms">
+  <Display>DocumentLibraryForm</Display>
+  <Edit>DocumentLibraryForm</Edit>
+  <New>DocumentLibraryForm</New>
+</FormTemplates>
+</file>
+
 <file path=customXml/itemProps1.xml><?xml version="1.0" encoding="utf-8"?>
 <ds:datastoreItem xmlns:ds="http://schemas.openxmlformats.org/officeDocument/2006/customXml" ds:itemID="{3791575F-4C21-47C4-8D13-EB9BE66B536F}">
   <ds:schemaRefs>
@@ -9076,14 +8258,6 @@
 </file>
 
 <file path=customXml/itemProps2.xml><?xml version="1.0" encoding="utf-8"?>
-<ds:datastoreItem xmlns:ds="http://schemas.openxmlformats.org/officeDocument/2006/customXml" ds:itemID="{342D3C2F-55A5-48C0-9D5A-95C7FF0389D0}">
-  <ds:schemaRefs>
-    <ds:schemaRef ds:uri="http://schemas.microsoft.com/sharepoint/v3/contenttype/forms"/>
-  </ds:schemaRefs>
-</ds:datastoreItem>
-</file>
-
-<file path=customXml/itemProps3.xml><?xml version="1.0" encoding="utf-8"?>
 <ds:datastoreItem xmlns:ds="http://schemas.openxmlformats.org/officeDocument/2006/customXml" ds:itemID="{792209EB-3212-4116-B574-D1F56C7C4922}">
   <ds:schemaRefs>
     <ds:schemaRef ds:uri="http://schemas.microsoft.com/office/2006/metadata/contentType"/>
@@ -9102,4 +8276,12 @@
     <ds:schemaRef ds:uri="http://schemas.microsoft.com/internal/obd"/>
   </ds:schemaRefs>
 </ds:datastoreItem>
+</file>
+
+<file path=customXml/itemProps3.xml><?xml version="1.0" encoding="utf-8"?>
+<ds:datastoreItem xmlns:ds="http://schemas.openxmlformats.org/officeDocument/2006/customXml" ds:itemID="{342D3C2F-55A5-48C0-9D5A-95C7FF0389D0}">
+  <ds:schemaRefs>
+    <ds:schemaRef ds:uri="http://schemas.microsoft.com/sharepoint/v3/contenttype/forms"/>
+  </ds:schemaRefs>
+</ds:datastoreItem>
 </file>
</xml_diff>

<commit_message>
RabbitMQ funcionando disparando as notificacoes pendentes para a api do Spring Webflux!
</commit_message>
<xml_diff>
--- a/docs/Notifications App.pptx
+++ b/docs/Notifications App.pptx
@@ -5,16 +5,17 @@
     <p:sldMasterId id="2147483672" r:id="rId4"/>
   </p:sldMasterIdLst>
   <p:notesMasterIdLst>
-    <p:notesMasterId r:id="rId9"/>
+    <p:notesMasterId r:id="rId10"/>
   </p:notesMasterIdLst>
   <p:handoutMasterIdLst>
-    <p:handoutMasterId r:id="rId10"/>
+    <p:handoutMasterId r:id="rId11"/>
   </p:handoutMasterIdLst>
   <p:sldIdLst>
     <p:sldId id="256" r:id="rId5"/>
-    <p:sldId id="263" r:id="rId6"/>
-    <p:sldId id="257" r:id="rId7"/>
-    <p:sldId id="260" r:id="rId8"/>
+    <p:sldId id="264" r:id="rId6"/>
+    <p:sldId id="263" r:id="rId7"/>
+    <p:sldId id="257" r:id="rId8"/>
+    <p:sldId id="260" r:id="rId9"/>
   </p:sldIdLst>
   <p:sldSz cx="12192000" cy="6858000"/>
   <p:notesSz cx="6858000" cy="9144000"/>
@@ -218,7 +219,7 @@
           <a:p>
             <a:fld id="{AF869721-F543-4A6C-BF9D-65D7CC540427}" type="datetimeFigureOut">
               <a:rPr lang="en-US" smtClean="0"/>
-              <a:t>5/14/2024</a:t>
+              <a:t>5/19/2024</a:t>
             </a:fld>
             <a:endParaRPr lang="en-US" dirty="0"/>
           </a:p>
@@ -395,7 +396,7 @@
           <a:p>
             <a:fld id="{C732326A-4C88-4AFB-AA5B-5919D81DFF5B}" type="datetimeFigureOut">
               <a:rPr lang="en-US" smtClean="0"/>
-              <a:t>5/14/2024</a:t>
+              <a:t>5/19/2024</a:t>
             </a:fld>
             <a:endParaRPr lang="en-US" dirty="0"/>
           </a:p>
@@ -811,7 +812,7 @@
           <a:p>
             <a:fld id="{C6B3AB32-59DF-41F1-9618-EDFBF5049629}" type="slidenum">
               <a:rPr lang="en-US" smtClean="0"/>
-              <a:t>4</a:t>
+              <a:t>5</a:t>
             </a:fld>
             <a:endParaRPr lang="en-US" dirty="0"/>
           </a:p>
@@ -1076,7 +1077,7 @@
             <a:fld id="{B61BEF0D-F0BB-DE4B-95CE-6DB70DBA9567}" type="datetimeFigureOut">
               <a:rPr lang="en-US" smtClean="0"/>
               <a:pPr/>
-              <a:t>5/14/2024</a:t>
+              <a:t>5/19/2024</a:t>
             </a:fld>
             <a:endParaRPr lang="en-US" dirty="0"/>
           </a:p>
@@ -1340,7 +1341,7 @@
             <a:fld id="{B61BEF0D-F0BB-DE4B-95CE-6DB70DBA9567}" type="datetimeFigureOut">
               <a:rPr lang="en-US" smtClean="0"/>
               <a:pPr/>
-              <a:t>5/14/2024</a:t>
+              <a:t>5/19/2024</a:t>
             </a:fld>
             <a:endParaRPr lang="en-US" dirty="0"/>
           </a:p>
@@ -1577,7 +1578,7 @@
             <a:fld id="{B61BEF0D-F0BB-DE4B-95CE-6DB70DBA9567}" type="datetimeFigureOut">
               <a:rPr lang="en-US" smtClean="0"/>
               <a:pPr/>
-              <a:t>5/14/2024</a:t>
+              <a:t>5/19/2024</a:t>
             </a:fld>
             <a:endParaRPr lang="en-US" dirty="0"/>
           </a:p>
@@ -1819,7 +1820,7 @@
             <a:fld id="{B61BEF0D-F0BB-DE4B-95CE-6DB70DBA9567}" type="datetimeFigureOut">
               <a:rPr lang="en-US" smtClean="0"/>
               <a:pPr/>
-              <a:t>5/14/2024</a:t>
+              <a:t>5/19/2024</a:t>
             </a:fld>
             <a:endParaRPr lang="en-US" dirty="0"/>
           </a:p>
@@ -2128,7 +2129,7 @@
             <a:fld id="{B61BEF0D-F0BB-DE4B-95CE-6DB70DBA9567}" type="datetimeFigureOut">
               <a:rPr lang="en-US" smtClean="0"/>
               <a:pPr/>
-              <a:t>5/14/2024</a:t>
+              <a:t>5/19/2024</a:t>
             </a:fld>
             <a:endParaRPr lang="en-US" dirty="0"/>
           </a:p>
@@ -2432,7 +2433,7 @@
             <a:fld id="{B61BEF0D-F0BB-DE4B-95CE-6DB70DBA9567}" type="datetimeFigureOut">
               <a:rPr lang="en-US" smtClean="0"/>
               <a:pPr/>
-              <a:t>5/14/2024</a:t>
+              <a:t>5/19/2024</a:t>
             </a:fld>
             <a:endParaRPr lang="en-US" dirty="0"/>
           </a:p>
@@ -2856,7 +2857,7 @@
             <a:fld id="{B61BEF0D-F0BB-DE4B-95CE-6DB70DBA9567}" type="datetimeFigureOut">
               <a:rPr lang="en-US" smtClean="0"/>
               <a:pPr/>
-              <a:t>5/14/2024</a:t>
+              <a:t>5/19/2024</a:t>
             </a:fld>
             <a:endParaRPr lang="en-US" dirty="0"/>
           </a:p>
@@ -2953,7 +2954,7 @@
             <a:fld id="{B61BEF0D-F0BB-DE4B-95CE-6DB70DBA9567}" type="datetimeFigureOut">
               <a:rPr lang="en-US" smtClean="0"/>
               <a:pPr/>
-              <a:t>5/14/2024</a:t>
+              <a:t>5/19/2024</a:t>
             </a:fld>
             <a:endParaRPr lang="en-US" dirty="0"/>
           </a:p>
@@ -3117,7 +3118,7 @@
             <a:fld id="{B61BEF0D-F0BB-DE4B-95CE-6DB70DBA9567}" type="datetimeFigureOut">
               <a:rPr lang="en-US" smtClean="0"/>
               <a:pPr/>
-              <a:t>5/14/2024</a:t>
+              <a:t>5/19/2024</a:t>
             </a:fld>
             <a:endParaRPr lang="en-US" dirty="0"/>
           </a:p>
@@ -3497,7 +3498,7 @@
             <a:fld id="{B61BEF0D-F0BB-DE4B-95CE-6DB70DBA9567}" type="datetimeFigureOut">
               <a:rPr lang="en-US" smtClean="0"/>
               <a:pPr/>
-              <a:t>5/14/2024</a:t>
+              <a:t>5/19/2024</a:t>
             </a:fld>
             <a:endParaRPr lang="en-US" dirty="0"/>
           </a:p>
@@ -3788,7 +3789,7 @@
             <a:fld id="{B61BEF0D-F0BB-DE4B-95CE-6DB70DBA9567}" type="datetimeFigureOut">
               <a:rPr lang="en-US" smtClean="0"/>
               <a:pPr/>
-              <a:t>5/14/2024</a:t>
+              <a:t>5/19/2024</a:t>
             </a:fld>
             <a:endParaRPr lang="en-US" dirty="0"/>
           </a:p>
@@ -4001,7 +4002,7 @@
             <a:fld id="{B61BEF0D-F0BB-DE4B-95CE-6DB70DBA9567}" type="datetimeFigureOut">
               <a:rPr lang="en-US" smtClean="0"/>
               <a:pPr/>
-              <a:t>5/14/2024</a:t>
+              <a:t>5/19/2024</a:t>
             </a:fld>
             <a:endParaRPr lang="en-US" dirty="0"/>
           </a:p>
@@ -5861,7 +5862,7 @@
     </p:spTree>
     <p:extLst>
       <p:ext uri="{BB962C8B-B14F-4D97-AF65-F5344CB8AC3E}">
-        <p14:creationId xmlns:p14="http://schemas.microsoft.com/office/powerpoint/2010/main" val="804599021"/>
+        <p14:creationId xmlns:p14="http://schemas.microsoft.com/office/powerpoint/2010/main" val="50950987"/>
       </p:ext>
     </p:extLst>
   </p:cSld>
@@ -5890,6 +5891,1130 @@
       </p:grpSpPr>
       <p:sp>
         <p:nvSpPr>
+          <p:cNvPr id="4" name="AutoShape 2">
+            <a:extLst>
+              <a:ext uri="{FF2B5EF4-FFF2-40B4-BE49-F238E27FC236}">
+                <a16:creationId xmlns:a16="http://schemas.microsoft.com/office/drawing/2014/main" id="{9DFAC3A3-0B98-49E9-08B1-58BEE065B811}"/>
+              </a:ext>
+            </a:extLst>
+          </p:cNvPr>
+          <p:cNvSpPr>
+            <a:spLocks noChangeAspect="1" noChangeArrowheads="1"/>
+          </p:cNvSpPr>
+          <p:nvPr/>
+        </p:nvSpPr>
+        <p:spPr bwMode="auto">
+          <a:xfrm>
+            <a:off x="5943600" y="3276600"/>
+            <a:ext cx="304800" cy="304800"/>
+          </a:xfrm>
+          <a:prstGeom prst="rect">
+            <a:avLst/>
+          </a:prstGeom>
+          <a:noFill/>
+          <a:extLst>
+            <a:ext uri="{909E8E84-426E-40DD-AFC4-6F175D3DCCD1}">
+              <a14:hiddenFill xmlns:a14="http://schemas.microsoft.com/office/drawing/2010/main">
+                <a:solidFill>
+                  <a:srgbClr val="FFFFFF"/>
+                </a:solidFill>
+              </a14:hiddenFill>
+            </a:ext>
+          </a:extLst>
+        </p:spPr>
+        <p:txBody>
+          <a:bodyPr vert="horz" wrap="square" lIns="91440" tIns="45720" rIns="91440" bIns="45720" numCol="1" anchor="t" anchorCtr="0" compatLnSpc="1">
+            <a:prstTxWarp prst="textNoShape">
+              <a:avLst/>
+            </a:prstTxWarp>
+          </a:bodyPr>
+          <a:lstStyle/>
+          <a:p>
+            <a:pPr algn="r"/>
+            <a:endParaRPr lang="en-US"/>
+          </a:p>
+        </p:txBody>
+      </p:sp>
+      <p:grpSp>
+        <p:nvGrpSpPr>
+          <p:cNvPr id="22" name="Agrupar 21">
+            <a:extLst>
+              <a:ext uri="{FF2B5EF4-FFF2-40B4-BE49-F238E27FC236}">
+                <a16:creationId xmlns:a16="http://schemas.microsoft.com/office/drawing/2014/main" id="{C049575C-62FE-E4FC-76B6-68DB9547DE76}"/>
+              </a:ext>
+            </a:extLst>
+          </p:cNvPr>
+          <p:cNvGrpSpPr/>
+          <p:nvPr/>
+        </p:nvGrpSpPr>
+        <p:grpSpPr>
+          <a:xfrm>
+            <a:off x="570720" y="3912359"/>
+            <a:ext cx="2392389" cy="2251586"/>
+            <a:chOff x="537622" y="1630303"/>
+            <a:chExt cx="2392389" cy="2251586"/>
+          </a:xfrm>
+        </p:grpSpPr>
+        <p:pic>
+          <p:nvPicPr>
+            <p:cNvPr id="23" name="Picture 2" descr="O que é Docker? | Mundo Docker">
+              <a:extLst>
+                <a:ext uri="{FF2B5EF4-FFF2-40B4-BE49-F238E27FC236}">
+                  <a16:creationId xmlns:a16="http://schemas.microsoft.com/office/drawing/2014/main" id="{B646D719-5859-A53D-21C0-5FE4662ABF0E}"/>
+                </a:ext>
+              </a:extLst>
+            </p:cNvPr>
+            <p:cNvPicPr>
+              <a:picLocks noChangeAspect="1" noChangeArrowheads="1"/>
+            </p:cNvPicPr>
+            <p:nvPr/>
+          </p:nvPicPr>
+          <p:blipFill>
+            <a:blip r:embed="rId2">
+              <a:extLst>
+                <a:ext uri="{28A0092B-C50C-407E-A947-70E740481C1C}">
+                  <a14:useLocalDpi xmlns:a14="http://schemas.microsoft.com/office/drawing/2010/main" val="0"/>
+                </a:ext>
+              </a:extLst>
+            </a:blip>
+            <a:srcRect/>
+            <a:stretch>
+              <a:fillRect/>
+            </a:stretch>
+          </p:blipFill>
+          <p:spPr bwMode="auto">
+            <a:xfrm>
+              <a:off x="2015764" y="3020828"/>
+              <a:ext cx="852488" cy="726193"/>
+            </a:xfrm>
+            <a:prstGeom prst="rect">
+              <a:avLst/>
+            </a:prstGeom>
+            <a:noFill/>
+            <a:extLst>
+              <a:ext uri="{909E8E84-426E-40DD-AFC4-6F175D3DCCD1}">
+                <a14:hiddenFill xmlns:a14="http://schemas.microsoft.com/office/drawing/2010/main">
+                  <a:solidFill>
+                    <a:srgbClr val="FFFFFF"/>
+                  </a:solidFill>
+                </a14:hiddenFill>
+              </a:ext>
+            </a:extLst>
+          </p:spPr>
+        </p:pic>
+        <p:pic>
+          <p:nvPicPr>
+            <p:cNvPr id="24" name="Picture 6" descr="How to Build a Rest API using Spring Boot | by Anup Sarkar | Medium">
+              <a:extLst>
+                <a:ext uri="{FF2B5EF4-FFF2-40B4-BE49-F238E27FC236}">
+                  <a16:creationId xmlns:a16="http://schemas.microsoft.com/office/drawing/2014/main" id="{A40D08A2-EACB-2211-46A1-614344C5A41C}"/>
+                </a:ext>
+              </a:extLst>
+            </p:cNvPr>
+            <p:cNvPicPr>
+              <a:picLocks noChangeAspect="1" noChangeArrowheads="1"/>
+            </p:cNvPicPr>
+            <p:nvPr/>
+          </p:nvPicPr>
+          <p:blipFill>
+            <a:blip r:embed="rId3">
+              <a:extLst>
+                <a:ext uri="{28A0092B-C50C-407E-A947-70E740481C1C}">
+                  <a14:useLocalDpi xmlns:a14="http://schemas.microsoft.com/office/drawing/2010/main" val="0"/>
+                </a:ext>
+              </a:extLst>
+            </a:blip>
+            <a:srcRect/>
+            <a:stretch>
+              <a:fillRect/>
+            </a:stretch>
+          </p:blipFill>
+          <p:spPr bwMode="auto">
+            <a:xfrm>
+              <a:off x="649464" y="2032545"/>
+              <a:ext cx="2098880" cy="816231"/>
+            </a:xfrm>
+            <a:prstGeom prst="rect">
+              <a:avLst/>
+            </a:prstGeom>
+            <a:noFill/>
+            <a:extLst>
+              <a:ext uri="{909E8E84-426E-40DD-AFC4-6F175D3DCCD1}">
+                <a14:hiddenFill xmlns:a14="http://schemas.microsoft.com/office/drawing/2010/main">
+                  <a:solidFill>
+                    <a:srgbClr val="FFFFFF"/>
+                  </a:solidFill>
+                </a14:hiddenFill>
+              </a:ext>
+            </a:extLst>
+          </p:spPr>
+        </p:pic>
+        <p:sp>
+          <p:nvSpPr>
+            <p:cNvPr id="25" name="CaixaDeTexto 24">
+              <a:extLst>
+                <a:ext uri="{FF2B5EF4-FFF2-40B4-BE49-F238E27FC236}">
+                  <a16:creationId xmlns:a16="http://schemas.microsoft.com/office/drawing/2014/main" id="{A3398D39-B0E5-55DD-BBF4-12C9965B3E1A}"/>
+                </a:ext>
+              </a:extLst>
+            </p:cNvPr>
+            <p:cNvSpPr txBox="1"/>
+            <p:nvPr/>
+          </p:nvSpPr>
+          <p:spPr>
+            <a:xfrm>
+              <a:off x="833439" y="2672751"/>
+              <a:ext cx="1792478" cy="369332"/>
+            </a:xfrm>
+            <a:prstGeom prst="rect">
+              <a:avLst/>
+            </a:prstGeom>
+            <a:noFill/>
+          </p:spPr>
+          <p:txBody>
+            <a:bodyPr wrap="none" rtlCol="0">
+              <a:spAutoFit/>
+            </a:bodyPr>
+            <a:lstStyle/>
+            <a:p>
+              <a:pPr algn="r"/>
+              <a:r>
+                <a:rPr lang="pt-BR" dirty="0" err="1"/>
+                <a:t>Notifications.war</a:t>
+              </a:r>
+              <a:endParaRPr lang="en-US" dirty="0"/>
+            </a:p>
+          </p:txBody>
+        </p:sp>
+        <p:sp>
+          <p:nvSpPr>
+            <p:cNvPr id="26" name="Fluxograma: Processo 25">
+              <a:extLst>
+                <a:ext uri="{FF2B5EF4-FFF2-40B4-BE49-F238E27FC236}">
+                  <a16:creationId xmlns:a16="http://schemas.microsoft.com/office/drawing/2014/main" id="{2C036A95-043D-9ACF-DFBF-D14701FC73B6}"/>
+                </a:ext>
+              </a:extLst>
+            </p:cNvPr>
+            <p:cNvSpPr/>
+            <p:nvPr/>
+          </p:nvSpPr>
+          <p:spPr>
+            <a:xfrm>
+              <a:off x="537622" y="1630303"/>
+              <a:ext cx="2392389" cy="2251586"/>
+            </a:xfrm>
+            <a:prstGeom prst="flowChartProcess">
+              <a:avLst/>
+            </a:prstGeom>
+            <a:noFill/>
+          </p:spPr>
+          <p:style>
+            <a:lnRef idx="2">
+              <a:schemeClr val="accent1">
+                <a:shade val="15000"/>
+              </a:schemeClr>
+            </a:lnRef>
+            <a:fillRef idx="1">
+              <a:schemeClr val="accent1"/>
+            </a:fillRef>
+            <a:effectRef idx="0">
+              <a:schemeClr val="accent1"/>
+            </a:effectRef>
+            <a:fontRef idx="minor">
+              <a:schemeClr val="lt1"/>
+            </a:fontRef>
+          </p:style>
+          <p:txBody>
+            <a:bodyPr rtlCol="0" anchor="ctr"/>
+            <a:lstStyle/>
+            <a:p>
+              <a:pPr algn="r"/>
+              <a:endParaRPr lang="en-US" dirty="0"/>
+            </a:p>
+          </p:txBody>
+        </p:sp>
+      </p:grpSp>
+      <p:grpSp>
+        <p:nvGrpSpPr>
+          <p:cNvPr id="34" name="Agrupar 33">
+            <a:extLst>
+              <a:ext uri="{FF2B5EF4-FFF2-40B4-BE49-F238E27FC236}">
+                <a16:creationId xmlns:a16="http://schemas.microsoft.com/office/drawing/2014/main" id="{F7014826-1837-7D91-CDE2-495D3EF3A73A}"/>
+              </a:ext>
+            </a:extLst>
+          </p:cNvPr>
+          <p:cNvGrpSpPr/>
+          <p:nvPr/>
+        </p:nvGrpSpPr>
+        <p:grpSpPr>
+          <a:xfrm>
+            <a:off x="3508648" y="3901559"/>
+            <a:ext cx="2392389" cy="2251586"/>
+            <a:chOff x="3154691" y="1630303"/>
+            <a:chExt cx="2392389" cy="2251586"/>
+          </a:xfrm>
+        </p:grpSpPr>
+        <p:grpSp>
+          <p:nvGrpSpPr>
+            <p:cNvPr id="33" name="Agrupar 32">
+              <a:extLst>
+                <a:ext uri="{FF2B5EF4-FFF2-40B4-BE49-F238E27FC236}">
+                  <a16:creationId xmlns:a16="http://schemas.microsoft.com/office/drawing/2014/main" id="{EEABA830-061D-D0D4-4DE1-ED996ACC2292}"/>
+                </a:ext>
+              </a:extLst>
+            </p:cNvPr>
+            <p:cNvGrpSpPr/>
+            <p:nvPr/>
+          </p:nvGrpSpPr>
+          <p:grpSpPr>
+            <a:xfrm>
+              <a:off x="3320230" y="1811316"/>
+              <a:ext cx="1170035" cy="1487287"/>
+              <a:chOff x="3320230" y="1811316"/>
+              <a:chExt cx="1170035" cy="1487287"/>
+            </a:xfrm>
+          </p:grpSpPr>
+          <p:sp>
+            <p:nvSpPr>
+              <p:cNvPr id="31" name="Fluxograma: Disco Magnético 30">
+                <a:extLst>
+                  <a:ext uri="{FF2B5EF4-FFF2-40B4-BE49-F238E27FC236}">
+                    <a16:creationId xmlns:a16="http://schemas.microsoft.com/office/drawing/2014/main" id="{BD95EFC9-4D55-6794-77D0-8730DC39A8B6}"/>
+                  </a:ext>
+                </a:extLst>
+              </p:cNvPr>
+              <p:cNvSpPr/>
+              <p:nvPr/>
+            </p:nvSpPr>
+            <p:spPr>
+              <a:xfrm>
+                <a:off x="3320230" y="1811316"/>
+                <a:ext cx="1170035" cy="1487287"/>
+              </a:xfrm>
+              <a:prstGeom prst="flowChartMagneticDisk">
+                <a:avLst/>
+              </a:prstGeom>
+              <a:solidFill>
+                <a:schemeClr val="bg1"/>
+              </a:solidFill>
+            </p:spPr>
+            <p:style>
+              <a:lnRef idx="2">
+                <a:schemeClr val="accent1">
+                  <a:shade val="15000"/>
+                </a:schemeClr>
+              </a:lnRef>
+              <a:fillRef idx="1">
+                <a:schemeClr val="accent1"/>
+              </a:fillRef>
+              <a:effectRef idx="0">
+                <a:schemeClr val="accent1"/>
+              </a:effectRef>
+              <a:fontRef idx="minor">
+                <a:schemeClr val="lt1"/>
+              </a:fontRef>
+            </p:style>
+            <p:txBody>
+              <a:bodyPr rtlCol="0" anchor="ctr"/>
+              <a:lstStyle/>
+              <a:p>
+                <a:pPr algn="r"/>
+                <a:endParaRPr lang="en-US"/>
+              </a:p>
+            </p:txBody>
+          </p:sp>
+          <p:pic>
+            <p:nvPicPr>
+              <p:cNvPr id="32" name="Picture 8" descr="Self-service Business Intelligence for PostgreSQL - Holistics |  Self-service BI Platform">
+                <a:extLst>
+                  <a:ext uri="{FF2B5EF4-FFF2-40B4-BE49-F238E27FC236}">
+                    <a16:creationId xmlns:a16="http://schemas.microsoft.com/office/drawing/2014/main" id="{E961A8DA-6503-DE71-B322-91A2DBE84915}"/>
+                  </a:ext>
+                </a:extLst>
+              </p:cNvPr>
+              <p:cNvPicPr>
+                <a:picLocks noChangeAspect="1" noChangeArrowheads="1"/>
+              </p:cNvPicPr>
+              <p:nvPr/>
+            </p:nvPicPr>
+            <p:blipFill>
+              <a:blip r:embed="rId4">
+                <a:extLst>
+                  <a:ext uri="{28A0092B-C50C-407E-A947-70E740481C1C}">
+                    <a14:useLocalDpi xmlns:a14="http://schemas.microsoft.com/office/drawing/2010/main" val="0"/>
+                  </a:ext>
+                </a:extLst>
+              </a:blip>
+              <a:srcRect/>
+              <a:stretch>
+                <a:fillRect/>
+              </a:stretch>
+            </p:blipFill>
+            <p:spPr bwMode="auto">
+              <a:xfrm>
+                <a:off x="3429195" y="2353398"/>
+                <a:ext cx="1002078" cy="808300"/>
+              </a:xfrm>
+              <a:prstGeom prst="rect">
+                <a:avLst/>
+              </a:prstGeom>
+              <a:noFill/>
+              <a:extLst>
+                <a:ext uri="{909E8E84-426E-40DD-AFC4-6F175D3DCCD1}">
+                  <a14:hiddenFill xmlns:a14="http://schemas.microsoft.com/office/drawing/2010/main">
+                    <a:solidFill>
+                      <a:srgbClr val="FFFFFF"/>
+                    </a:solidFill>
+                  </a14:hiddenFill>
+                </a:ext>
+              </a:extLst>
+            </p:spPr>
+          </p:pic>
+        </p:grpSp>
+        <p:pic>
+          <p:nvPicPr>
+            <p:cNvPr id="29" name="Picture 2" descr="O que é Docker? | Mundo Docker">
+              <a:extLst>
+                <a:ext uri="{FF2B5EF4-FFF2-40B4-BE49-F238E27FC236}">
+                  <a16:creationId xmlns:a16="http://schemas.microsoft.com/office/drawing/2014/main" id="{CFC50A15-44EA-FA56-02E6-76075F7758E2}"/>
+                </a:ext>
+              </a:extLst>
+            </p:cNvPr>
+            <p:cNvPicPr>
+              <a:picLocks noChangeAspect="1" noChangeArrowheads="1"/>
+            </p:cNvPicPr>
+            <p:nvPr/>
+          </p:nvPicPr>
+          <p:blipFill>
+            <a:blip r:embed="rId2">
+              <a:extLst>
+                <a:ext uri="{28A0092B-C50C-407E-A947-70E740481C1C}">
+                  <a14:useLocalDpi xmlns:a14="http://schemas.microsoft.com/office/drawing/2010/main" val="0"/>
+                </a:ext>
+              </a:extLst>
+            </a:blip>
+            <a:srcRect/>
+            <a:stretch>
+              <a:fillRect/>
+            </a:stretch>
+          </p:blipFill>
+          <p:spPr bwMode="auto">
+            <a:xfrm>
+              <a:off x="4632833" y="3020828"/>
+              <a:ext cx="852488" cy="726193"/>
+            </a:xfrm>
+            <a:prstGeom prst="rect">
+              <a:avLst/>
+            </a:prstGeom>
+            <a:noFill/>
+            <a:extLst>
+              <a:ext uri="{909E8E84-426E-40DD-AFC4-6F175D3DCCD1}">
+                <a14:hiddenFill xmlns:a14="http://schemas.microsoft.com/office/drawing/2010/main">
+                  <a:solidFill>
+                    <a:srgbClr val="FFFFFF"/>
+                  </a:solidFill>
+                </a14:hiddenFill>
+              </a:ext>
+            </a:extLst>
+          </p:spPr>
+        </p:pic>
+        <p:sp>
+          <p:nvSpPr>
+            <p:cNvPr id="30" name="Fluxograma: Processo 29">
+              <a:extLst>
+                <a:ext uri="{FF2B5EF4-FFF2-40B4-BE49-F238E27FC236}">
+                  <a16:creationId xmlns:a16="http://schemas.microsoft.com/office/drawing/2014/main" id="{67305F1A-7B7F-49BB-749D-9A7182B3BEC9}"/>
+                </a:ext>
+              </a:extLst>
+            </p:cNvPr>
+            <p:cNvSpPr/>
+            <p:nvPr/>
+          </p:nvSpPr>
+          <p:spPr>
+            <a:xfrm>
+              <a:off x="3154691" y="1630303"/>
+              <a:ext cx="2392389" cy="2251586"/>
+            </a:xfrm>
+            <a:prstGeom prst="flowChartProcess">
+              <a:avLst/>
+            </a:prstGeom>
+            <a:noFill/>
+          </p:spPr>
+          <p:style>
+            <a:lnRef idx="2">
+              <a:schemeClr val="accent1">
+                <a:shade val="15000"/>
+              </a:schemeClr>
+            </a:lnRef>
+            <a:fillRef idx="1">
+              <a:schemeClr val="accent1"/>
+            </a:fillRef>
+            <a:effectRef idx="0">
+              <a:schemeClr val="accent1"/>
+            </a:effectRef>
+            <a:fontRef idx="minor">
+              <a:schemeClr val="lt1"/>
+            </a:fontRef>
+          </p:style>
+          <p:txBody>
+            <a:bodyPr rtlCol="0" anchor="ctr"/>
+            <a:lstStyle/>
+            <a:p>
+              <a:pPr algn="r"/>
+              <a:endParaRPr lang="en-US" dirty="0"/>
+            </a:p>
+          </p:txBody>
+        </p:sp>
+      </p:grpSp>
+      <p:pic>
+        <p:nvPicPr>
+          <p:cNvPr id="8" name="Picture 4" descr="Docker: Compose. Explorando o Docker Compose | by Hugo Habbema | Medium">
+            <a:extLst>
+              <a:ext uri="{FF2B5EF4-FFF2-40B4-BE49-F238E27FC236}">
+                <a16:creationId xmlns:a16="http://schemas.microsoft.com/office/drawing/2014/main" id="{6A487418-6986-5B81-EBD4-D158C85E1F0B}"/>
+              </a:ext>
+            </a:extLst>
+          </p:cNvPr>
+          <p:cNvPicPr>
+            <a:picLocks noChangeAspect="1" noChangeArrowheads="1"/>
+          </p:cNvPicPr>
+          <p:nvPr/>
+        </p:nvPicPr>
+        <p:blipFill>
+          <a:blip r:embed="rId5">
+            <a:extLst>
+              <a:ext uri="{28A0092B-C50C-407E-A947-70E740481C1C}">
+                <a14:useLocalDpi xmlns:a14="http://schemas.microsoft.com/office/drawing/2010/main" val="0"/>
+              </a:ext>
+            </a:extLst>
+          </a:blip>
+          <a:srcRect/>
+          <a:stretch>
+            <a:fillRect/>
+          </a:stretch>
+        </p:blipFill>
+        <p:spPr bwMode="auto">
+          <a:xfrm>
+            <a:off x="4043037" y="1495998"/>
+            <a:ext cx="3592481" cy="1732927"/>
+          </a:xfrm>
+          <a:prstGeom prst="rect">
+            <a:avLst/>
+          </a:prstGeom>
+          <a:noFill/>
+          <a:extLst>
+            <a:ext uri="{909E8E84-426E-40DD-AFC4-6F175D3DCCD1}">
+              <a14:hiddenFill xmlns:a14="http://schemas.microsoft.com/office/drawing/2010/main">
+                <a:solidFill>
+                  <a:srgbClr val="FFFFFF"/>
+                </a:solidFill>
+              </a14:hiddenFill>
+            </a:ext>
+          </a:extLst>
+        </p:spPr>
+      </p:pic>
+      <p:sp>
+        <p:nvSpPr>
+          <p:cNvPr id="9" name="Fluxograma: Processo 8">
+            <a:extLst>
+              <a:ext uri="{FF2B5EF4-FFF2-40B4-BE49-F238E27FC236}">
+                <a16:creationId xmlns:a16="http://schemas.microsoft.com/office/drawing/2014/main" id="{D4473F6A-5EE2-C4BE-9412-B5F081F61EA3}"/>
+              </a:ext>
+            </a:extLst>
+          </p:cNvPr>
+          <p:cNvSpPr/>
+          <p:nvPr/>
+        </p:nvSpPr>
+        <p:spPr>
+          <a:xfrm>
+            <a:off x="219456" y="1615515"/>
+            <a:ext cx="11853637" cy="4854837"/>
+          </a:xfrm>
+          <a:prstGeom prst="flowChartProcess">
+            <a:avLst/>
+          </a:prstGeom>
+          <a:noFill/>
+        </p:spPr>
+        <p:style>
+          <a:lnRef idx="2">
+            <a:schemeClr val="accent1">
+              <a:shade val="15000"/>
+            </a:schemeClr>
+          </a:lnRef>
+          <a:fillRef idx="1">
+            <a:schemeClr val="accent1"/>
+          </a:fillRef>
+          <a:effectRef idx="0">
+            <a:schemeClr val="accent1"/>
+          </a:effectRef>
+          <a:fontRef idx="minor">
+            <a:schemeClr val="lt1"/>
+          </a:fontRef>
+        </p:style>
+        <p:txBody>
+          <a:bodyPr rtlCol="0" anchor="ctr"/>
+          <a:lstStyle/>
+          <a:p>
+            <a:pPr algn="r"/>
+            <a:endParaRPr lang="en-US" dirty="0"/>
+          </a:p>
+        </p:txBody>
+      </p:sp>
+      <p:grpSp>
+        <p:nvGrpSpPr>
+          <p:cNvPr id="10" name="Agrupar 9">
+            <a:extLst>
+              <a:ext uri="{FF2B5EF4-FFF2-40B4-BE49-F238E27FC236}">
+                <a16:creationId xmlns:a16="http://schemas.microsoft.com/office/drawing/2014/main" id="{3DE0C579-074F-E3DE-9275-F9C5E2B632C0}"/>
+              </a:ext>
+            </a:extLst>
+          </p:cNvPr>
+          <p:cNvGrpSpPr/>
+          <p:nvPr/>
+        </p:nvGrpSpPr>
+        <p:grpSpPr>
+          <a:xfrm>
+            <a:off x="9500842" y="3901559"/>
+            <a:ext cx="2392389" cy="2251586"/>
+            <a:chOff x="3587722" y="3878380"/>
+            <a:chExt cx="2392389" cy="2251586"/>
+          </a:xfrm>
+        </p:grpSpPr>
+        <p:pic>
+          <p:nvPicPr>
+            <p:cNvPr id="11" name="Picture 2" descr="O que é Docker? | Mundo Docker">
+              <a:extLst>
+                <a:ext uri="{FF2B5EF4-FFF2-40B4-BE49-F238E27FC236}">
+                  <a16:creationId xmlns:a16="http://schemas.microsoft.com/office/drawing/2014/main" id="{7624A672-3868-55C3-D99E-19ACDF2D604B}"/>
+                </a:ext>
+              </a:extLst>
+            </p:cNvPr>
+            <p:cNvPicPr>
+              <a:picLocks noChangeAspect="1" noChangeArrowheads="1"/>
+            </p:cNvPicPr>
+            <p:nvPr/>
+          </p:nvPicPr>
+          <p:blipFill>
+            <a:blip r:embed="rId2">
+              <a:extLst>
+                <a:ext uri="{28A0092B-C50C-407E-A947-70E740481C1C}">
+                  <a14:useLocalDpi xmlns:a14="http://schemas.microsoft.com/office/drawing/2010/main" val="0"/>
+                </a:ext>
+              </a:extLst>
+            </a:blip>
+            <a:srcRect/>
+            <a:stretch>
+              <a:fillRect/>
+            </a:stretch>
+          </p:blipFill>
+          <p:spPr bwMode="auto">
+            <a:xfrm>
+              <a:off x="5074031" y="3937160"/>
+              <a:ext cx="852488" cy="726193"/>
+            </a:xfrm>
+            <a:prstGeom prst="rect">
+              <a:avLst/>
+            </a:prstGeom>
+            <a:noFill/>
+            <a:extLst>
+              <a:ext uri="{909E8E84-426E-40DD-AFC4-6F175D3DCCD1}">
+                <a14:hiddenFill xmlns:a14="http://schemas.microsoft.com/office/drawing/2010/main">
+                  <a:solidFill>
+                    <a:srgbClr val="FFFFFF"/>
+                  </a:solidFill>
+                </a14:hiddenFill>
+              </a:ext>
+            </a:extLst>
+          </p:spPr>
+        </p:pic>
+        <p:sp>
+          <p:nvSpPr>
+            <p:cNvPr id="12" name="Fluxograma: Processo 11">
+              <a:extLst>
+                <a:ext uri="{FF2B5EF4-FFF2-40B4-BE49-F238E27FC236}">
+                  <a16:creationId xmlns:a16="http://schemas.microsoft.com/office/drawing/2014/main" id="{E970AF75-A56B-0F8E-204C-6B86FF19C857}"/>
+                </a:ext>
+              </a:extLst>
+            </p:cNvPr>
+            <p:cNvSpPr/>
+            <p:nvPr/>
+          </p:nvSpPr>
+          <p:spPr>
+            <a:xfrm>
+              <a:off x="3587722" y="3878380"/>
+              <a:ext cx="2392389" cy="2251586"/>
+            </a:xfrm>
+            <a:prstGeom prst="flowChartProcess">
+              <a:avLst/>
+            </a:prstGeom>
+            <a:noFill/>
+          </p:spPr>
+          <p:style>
+            <a:lnRef idx="2">
+              <a:schemeClr val="accent1">
+                <a:shade val="15000"/>
+              </a:schemeClr>
+            </a:lnRef>
+            <a:fillRef idx="1">
+              <a:schemeClr val="accent1"/>
+            </a:fillRef>
+            <a:effectRef idx="0">
+              <a:schemeClr val="accent1"/>
+            </a:effectRef>
+            <a:fontRef idx="minor">
+              <a:schemeClr val="lt1"/>
+            </a:fontRef>
+          </p:style>
+          <p:txBody>
+            <a:bodyPr rtlCol="0" anchor="ctr"/>
+            <a:lstStyle/>
+            <a:p>
+              <a:pPr algn="r"/>
+              <a:endParaRPr lang="en-US" dirty="0"/>
+            </a:p>
+          </p:txBody>
+        </p:sp>
+        <p:grpSp>
+          <p:nvGrpSpPr>
+            <p:cNvPr id="13" name="Agrupar 12">
+              <a:extLst>
+                <a:ext uri="{FF2B5EF4-FFF2-40B4-BE49-F238E27FC236}">
+                  <a16:creationId xmlns:a16="http://schemas.microsoft.com/office/drawing/2014/main" id="{0F35B7FB-7AE4-153C-5D05-F3FF88E38828}"/>
+                </a:ext>
+              </a:extLst>
+            </p:cNvPr>
+            <p:cNvGrpSpPr/>
+            <p:nvPr/>
+          </p:nvGrpSpPr>
+          <p:grpSpPr>
+            <a:xfrm>
+              <a:off x="3701944" y="4525020"/>
+              <a:ext cx="1170035" cy="1487287"/>
+              <a:chOff x="3623919" y="1861444"/>
+              <a:chExt cx="1170035" cy="1487287"/>
+            </a:xfrm>
+          </p:grpSpPr>
+          <p:sp>
+            <p:nvSpPr>
+              <p:cNvPr id="14" name="Fluxograma: Disco Magnético 13">
+                <a:extLst>
+                  <a:ext uri="{FF2B5EF4-FFF2-40B4-BE49-F238E27FC236}">
+                    <a16:creationId xmlns:a16="http://schemas.microsoft.com/office/drawing/2014/main" id="{9DA86CE0-CCD7-F7B2-4FBA-EB3989547C3D}"/>
+                  </a:ext>
+                </a:extLst>
+              </p:cNvPr>
+              <p:cNvSpPr/>
+              <p:nvPr/>
+            </p:nvSpPr>
+            <p:spPr>
+              <a:xfrm>
+                <a:off x="3623919" y="1861444"/>
+                <a:ext cx="1170035" cy="1487287"/>
+              </a:xfrm>
+              <a:prstGeom prst="flowChartMagneticDisk">
+                <a:avLst/>
+              </a:prstGeom>
+              <a:solidFill>
+                <a:schemeClr val="bg1"/>
+              </a:solidFill>
+              <a:ln>
+                <a:solidFill>
+                  <a:schemeClr val="tx1"/>
+                </a:solidFill>
+              </a:ln>
+            </p:spPr>
+            <p:style>
+              <a:lnRef idx="2">
+                <a:schemeClr val="accent1">
+                  <a:shade val="15000"/>
+                </a:schemeClr>
+              </a:lnRef>
+              <a:fillRef idx="1">
+                <a:schemeClr val="accent1"/>
+              </a:fillRef>
+              <a:effectRef idx="0">
+                <a:schemeClr val="accent1"/>
+              </a:effectRef>
+              <a:fontRef idx="minor">
+                <a:schemeClr val="lt1"/>
+              </a:fontRef>
+            </p:style>
+            <p:txBody>
+              <a:bodyPr rtlCol="0" anchor="ctr"/>
+              <a:lstStyle/>
+              <a:p>
+                <a:pPr algn="r"/>
+                <a:endParaRPr lang="en-US"/>
+              </a:p>
+            </p:txBody>
+          </p:sp>
+          <p:pic>
+            <p:nvPicPr>
+              <p:cNvPr id="15" name="Picture 4" descr="How to get started with MongoDB in 10 minutes | by Navindu Jayatilake |  We've moved to freeCodeCamp.org/news | Medium">
+                <a:extLst>
+                  <a:ext uri="{FF2B5EF4-FFF2-40B4-BE49-F238E27FC236}">
+                    <a16:creationId xmlns:a16="http://schemas.microsoft.com/office/drawing/2014/main" id="{ECBD0AEB-EC06-C20D-6CD9-56928BED2F44}"/>
+                  </a:ext>
+                </a:extLst>
+              </p:cNvPr>
+              <p:cNvPicPr>
+                <a:picLocks noChangeAspect="1" noChangeArrowheads="1"/>
+              </p:cNvPicPr>
+              <p:nvPr/>
+            </p:nvPicPr>
+            <p:blipFill>
+              <a:blip r:embed="rId6">
+                <a:extLst>
+                  <a:ext uri="{28A0092B-C50C-407E-A947-70E740481C1C}">
+                    <a14:useLocalDpi xmlns:a14="http://schemas.microsoft.com/office/drawing/2010/main" val="0"/>
+                  </a:ext>
+                </a:extLst>
+              </a:blip>
+              <a:srcRect/>
+              <a:stretch>
+                <a:fillRect/>
+              </a:stretch>
+            </p:blipFill>
+            <p:spPr bwMode="auto">
+              <a:xfrm>
+                <a:off x="3792329" y="2390204"/>
+                <a:ext cx="849407" cy="849407"/>
+              </a:xfrm>
+              <a:prstGeom prst="rect">
+                <a:avLst/>
+              </a:prstGeom>
+              <a:noFill/>
+              <a:extLst>
+                <a:ext uri="{909E8E84-426E-40DD-AFC4-6F175D3DCCD1}">
+                  <a14:hiddenFill xmlns:a14="http://schemas.microsoft.com/office/drawing/2010/main">
+                    <a:solidFill>
+                      <a:srgbClr val="FFFFFF"/>
+                    </a:solidFill>
+                  </a14:hiddenFill>
+                </a:ext>
+              </a:extLst>
+            </p:spPr>
+          </p:pic>
+        </p:grpSp>
+      </p:grpSp>
+      <p:grpSp>
+        <p:nvGrpSpPr>
+          <p:cNvPr id="16" name="Agrupar 15">
+            <a:extLst>
+              <a:ext uri="{FF2B5EF4-FFF2-40B4-BE49-F238E27FC236}">
+                <a16:creationId xmlns:a16="http://schemas.microsoft.com/office/drawing/2014/main" id="{62F9BAC9-AFB3-7E11-8209-7CE9C2F77014}"/>
+              </a:ext>
+            </a:extLst>
+          </p:cNvPr>
+          <p:cNvGrpSpPr/>
+          <p:nvPr/>
+        </p:nvGrpSpPr>
+        <p:grpSpPr>
+          <a:xfrm>
+            <a:off x="6509734" y="3895235"/>
+            <a:ext cx="2580482" cy="2292474"/>
+            <a:chOff x="537622" y="1630303"/>
+            <a:chExt cx="2580482" cy="2292474"/>
+          </a:xfrm>
+        </p:grpSpPr>
+        <p:sp>
+          <p:nvSpPr>
+            <p:cNvPr id="18" name="Fluxograma: Processo 17">
+              <a:extLst>
+                <a:ext uri="{FF2B5EF4-FFF2-40B4-BE49-F238E27FC236}">
+                  <a16:creationId xmlns:a16="http://schemas.microsoft.com/office/drawing/2014/main" id="{1CE5BB06-6A8B-BB49-2D1B-7F7AAE7EF98E}"/>
+                </a:ext>
+              </a:extLst>
+            </p:cNvPr>
+            <p:cNvSpPr/>
+            <p:nvPr/>
+          </p:nvSpPr>
+          <p:spPr>
+            <a:xfrm>
+              <a:off x="537622" y="1630303"/>
+              <a:ext cx="2580482" cy="2292474"/>
+            </a:xfrm>
+            <a:prstGeom prst="flowChartProcess">
+              <a:avLst/>
+            </a:prstGeom>
+            <a:noFill/>
+          </p:spPr>
+          <p:style>
+            <a:lnRef idx="2">
+              <a:schemeClr val="accent1">
+                <a:shade val="15000"/>
+              </a:schemeClr>
+            </a:lnRef>
+            <a:fillRef idx="1">
+              <a:schemeClr val="accent1"/>
+            </a:fillRef>
+            <a:effectRef idx="0">
+              <a:schemeClr val="accent1"/>
+            </a:effectRef>
+            <a:fontRef idx="minor">
+              <a:schemeClr val="lt1"/>
+            </a:fontRef>
+          </p:style>
+          <p:txBody>
+            <a:bodyPr rtlCol="0" anchor="ctr"/>
+            <a:lstStyle/>
+            <a:p>
+              <a:pPr algn="r"/>
+              <a:endParaRPr lang="en-US" dirty="0"/>
+            </a:p>
+          </p:txBody>
+        </p:sp>
+        <p:pic>
+          <p:nvPicPr>
+            <p:cNvPr id="19" name="Picture 2" descr="Logging Incoming Requests in Spring WebFlux | by Dursun KOÇ | Medium">
+              <a:extLst>
+                <a:ext uri="{FF2B5EF4-FFF2-40B4-BE49-F238E27FC236}">
+                  <a16:creationId xmlns:a16="http://schemas.microsoft.com/office/drawing/2014/main" id="{681C63F1-3B11-A906-024C-7F1365A07967}"/>
+                </a:ext>
+              </a:extLst>
+            </p:cNvPr>
+            <p:cNvPicPr>
+              <a:picLocks noChangeAspect="1" noChangeArrowheads="1"/>
+            </p:cNvPicPr>
+            <p:nvPr/>
+          </p:nvPicPr>
+          <p:blipFill>
+            <a:blip r:embed="rId7">
+              <a:extLst>
+                <a:ext uri="{28A0092B-C50C-407E-A947-70E740481C1C}">
+                  <a14:useLocalDpi xmlns:a14="http://schemas.microsoft.com/office/drawing/2010/main" val="0"/>
+                </a:ext>
+              </a:extLst>
+            </a:blip>
+            <a:srcRect/>
+            <a:stretch>
+              <a:fillRect/>
+            </a:stretch>
+          </p:blipFill>
+          <p:spPr bwMode="auto">
+            <a:xfrm>
+              <a:off x="576448" y="2275990"/>
+              <a:ext cx="2495450" cy="1410472"/>
+            </a:xfrm>
+            <a:prstGeom prst="rect">
+              <a:avLst/>
+            </a:prstGeom>
+            <a:noFill/>
+            <a:extLst>
+              <a:ext uri="{909E8E84-426E-40DD-AFC4-6F175D3DCCD1}">
+                <a14:hiddenFill xmlns:a14="http://schemas.microsoft.com/office/drawing/2010/main">
+                  <a:solidFill>
+                    <a:srgbClr val="FFFFFF"/>
+                  </a:solidFill>
+                </a14:hiddenFill>
+              </a:ext>
+            </a:extLst>
+          </p:spPr>
+        </p:pic>
+        <p:sp>
+          <p:nvSpPr>
+            <p:cNvPr id="27" name="CaixaDeTexto 26">
+              <a:extLst>
+                <a:ext uri="{FF2B5EF4-FFF2-40B4-BE49-F238E27FC236}">
+                  <a16:creationId xmlns:a16="http://schemas.microsoft.com/office/drawing/2014/main" id="{9C904CAD-A60E-B8C6-2708-22F0A106EE1B}"/>
+                </a:ext>
+              </a:extLst>
+            </p:cNvPr>
+            <p:cNvSpPr txBox="1"/>
+            <p:nvPr/>
+          </p:nvSpPr>
+          <p:spPr>
+            <a:xfrm>
+              <a:off x="691724" y="3608609"/>
+              <a:ext cx="2264898" cy="276999"/>
+            </a:xfrm>
+            <a:prstGeom prst="rect">
+              <a:avLst/>
+            </a:prstGeom>
+            <a:noFill/>
+          </p:spPr>
+          <p:txBody>
+            <a:bodyPr wrap="square" rtlCol="0">
+              <a:spAutoFit/>
+            </a:bodyPr>
+            <a:lstStyle/>
+            <a:p>
+              <a:pPr algn="r"/>
+              <a:r>
+                <a:rPr lang="en-US" sz="1200" dirty="0"/>
+                <a:t>notifications-reative-webflux.jar</a:t>
+              </a:r>
+            </a:p>
+          </p:txBody>
+        </p:sp>
+        <p:pic>
+          <p:nvPicPr>
+            <p:cNvPr id="28" name="Picture 2" descr="O que é Docker? | Mundo Docker">
+              <a:extLst>
+                <a:ext uri="{FF2B5EF4-FFF2-40B4-BE49-F238E27FC236}">
+                  <a16:creationId xmlns:a16="http://schemas.microsoft.com/office/drawing/2014/main" id="{8F4C0EE8-BFCC-8643-A0D4-A3DFE673596E}"/>
+                </a:ext>
+              </a:extLst>
+            </p:cNvPr>
+            <p:cNvPicPr>
+              <a:picLocks noChangeAspect="1" noChangeArrowheads="1"/>
+            </p:cNvPicPr>
+            <p:nvPr/>
+          </p:nvPicPr>
+          <p:blipFill>
+            <a:blip r:embed="rId2">
+              <a:extLst>
+                <a:ext uri="{28A0092B-C50C-407E-A947-70E740481C1C}">
+                  <a14:useLocalDpi xmlns:a14="http://schemas.microsoft.com/office/drawing/2010/main" val="0"/>
+                </a:ext>
+              </a:extLst>
+            </a:blip>
+            <a:srcRect/>
+            <a:stretch>
+              <a:fillRect/>
+            </a:stretch>
+          </p:blipFill>
+          <p:spPr bwMode="auto">
+            <a:xfrm>
+              <a:off x="1579045" y="1713747"/>
+              <a:ext cx="852488" cy="726193"/>
+            </a:xfrm>
+            <a:prstGeom prst="rect">
+              <a:avLst/>
+            </a:prstGeom>
+            <a:noFill/>
+            <a:extLst>
+              <a:ext uri="{909E8E84-426E-40DD-AFC4-6F175D3DCCD1}">
+                <a14:hiddenFill xmlns:a14="http://schemas.microsoft.com/office/drawing/2010/main">
+                  <a:solidFill>
+                    <a:srgbClr val="FFFFFF"/>
+                  </a:solidFill>
+                </a14:hiddenFill>
+              </a:ext>
+            </a:extLst>
+          </p:spPr>
+        </p:pic>
+      </p:grpSp>
+      <p:sp>
+        <p:nvSpPr>
+          <p:cNvPr id="38" name="CaixaDeTexto 37">
+            <a:extLst>
+              <a:ext uri="{FF2B5EF4-FFF2-40B4-BE49-F238E27FC236}">
+                <a16:creationId xmlns:a16="http://schemas.microsoft.com/office/drawing/2014/main" id="{CC6D093F-8BAA-21EF-5F98-0F75C25ECF6F}"/>
+              </a:ext>
+            </a:extLst>
+          </p:cNvPr>
+          <p:cNvSpPr txBox="1"/>
+          <p:nvPr/>
+        </p:nvSpPr>
+        <p:spPr>
+          <a:xfrm>
+            <a:off x="432470" y="2597238"/>
+            <a:ext cx="4554320" cy="923330"/>
+          </a:xfrm>
+          <a:prstGeom prst="rect">
+            <a:avLst/>
+          </a:prstGeom>
+          <a:noFill/>
+        </p:spPr>
+        <p:txBody>
+          <a:bodyPr wrap="square" rtlCol="0">
+            <a:spAutoFit/>
+          </a:bodyPr>
+          <a:lstStyle/>
+          <a:p>
+            <a:r>
+              <a:rPr lang="pt-BR" dirty="0"/>
+              <a:t>- Controle de </a:t>
+            </a:r>
+            <a:r>
+              <a:rPr lang="pt-BR" dirty="0" err="1"/>
+              <a:t>Usuario</a:t>
+            </a:r>
+            <a:endParaRPr lang="pt-BR" dirty="0"/>
+          </a:p>
+          <a:p>
+            <a:r>
+              <a:rPr lang="pt-BR" dirty="0"/>
+              <a:t>- Controle de envio Notificações</a:t>
+            </a:r>
+          </a:p>
+          <a:p>
+            <a:r>
+              <a:rPr lang="pt-BR" dirty="0"/>
+              <a:t>- Disparo das notificações usando Mensageria</a:t>
+            </a:r>
+            <a:endParaRPr lang="en-US" dirty="0"/>
+          </a:p>
+        </p:txBody>
+      </p:sp>
+      <p:sp>
+        <p:nvSpPr>
+          <p:cNvPr id="39" name="CaixaDeTexto 38">
+            <a:extLst>
+              <a:ext uri="{FF2B5EF4-FFF2-40B4-BE49-F238E27FC236}">
+                <a16:creationId xmlns:a16="http://schemas.microsoft.com/office/drawing/2014/main" id="{7DCBCF62-D25D-F373-A746-5A2EDE075776}"/>
+              </a:ext>
+            </a:extLst>
+          </p:cNvPr>
+          <p:cNvSpPr txBox="1"/>
+          <p:nvPr/>
+        </p:nvSpPr>
+        <p:spPr>
+          <a:xfrm>
+            <a:off x="6533211" y="3066440"/>
+            <a:ext cx="4554320" cy="369332"/>
+          </a:xfrm>
+          <a:prstGeom prst="rect">
+            <a:avLst/>
+          </a:prstGeom>
+          <a:noFill/>
+        </p:spPr>
+        <p:txBody>
+          <a:bodyPr wrap="square" rtlCol="0">
+            <a:spAutoFit/>
+          </a:bodyPr>
+          <a:lstStyle/>
+          <a:p>
+            <a:r>
+              <a:rPr lang="pt-BR" dirty="0"/>
+              <a:t>- Recebimento das Notificações Reativo</a:t>
+            </a:r>
+          </a:p>
+        </p:txBody>
+      </p:sp>
+    </p:spTree>
+    <p:extLst>
+      <p:ext uri="{BB962C8B-B14F-4D97-AF65-F5344CB8AC3E}">
+        <p14:creationId xmlns:p14="http://schemas.microsoft.com/office/powerpoint/2010/main" val="804599021"/>
+      </p:ext>
+    </p:extLst>
+  </p:cSld>
+  <p:clrMapOvr>
+    <a:masterClrMapping/>
+  </p:clrMapOvr>
+</p:sld>
+</file>
+
+<file path=ppt/slides/slide4.xml><?xml version="1.0" encoding="utf-8"?>
+<p:sld xmlns:a="http://schemas.openxmlformats.org/drawingml/2006/main" xmlns:r="http://schemas.openxmlformats.org/officeDocument/2006/relationships" xmlns:p="http://schemas.openxmlformats.org/presentationml/2006/main">
+  <p:cSld>
+    <p:spTree>
+      <p:nvGrpSpPr>
+        <p:cNvPr id="1" name=""/>
+        <p:cNvGrpSpPr/>
+        <p:nvPr/>
+      </p:nvGrpSpPr>
+      <p:grpSpPr>
+        <a:xfrm>
+          <a:off x="0" y="0"/>
+          <a:ext cx="0" cy="0"/>
+          <a:chOff x="0" y="0"/>
+          <a:chExt cx="0" cy="0"/>
+        </a:xfrm>
+      </p:grpSpPr>
+      <p:sp>
+        <p:nvSpPr>
           <p:cNvPr id="2" name="CaixaDeTexto 1">
             <a:extLst>
               <a:ext uri="{FF2B5EF4-FFF2-40B4-BE49-F238E27FC236}">
@@ -6311,7 +7436,7 @@
                 </a:solidFill>
                 <a:latin typeface="Consolas" panose="020B0609020204030204" pitchFamily="49" charset="0"/>
               </a:rPr>
-              <a:t>GET   </a:t>
+              <a:t>PUT   </a:t>
             </a:r>
             <a:r>
               <a:rPr lang="en-US" sz="1600" dirty="0">
@@ -6546,7 +7671,7 @@
 </p:sld>
 </file>
 
-<file path=ppt/slides/slide4.xml><?xml version="1.0" encoding="utf-8"?>
+<file path=ppt/slides/slide5.xml><?xml version="1.0" encoding="utf-8"?>
 <p:sld xmlns:a="http://schemas.openxmlformats.org/drawingml/2006/main" xmlns:r="http://schemas.openxmlformats.org/officeDocument/2006/relationships" xmlns:p="http://schemas.openxmlformats.org/presentationml/2006/main">
   <p:cSld>
     <p:bg>
@@ -7931,6 +9056,15 @@
 </file>
 
 <file path=customXml/item2.xml><?xml version="1.0" encoding="utf-8"?>
+<?mso-contentType ?>
+<FormTemplates xmlns="http://schemas.microsoft.com/sharepoint/v3/contenttype/forms">
+  <Display>DocumentLibraryForm</Display>
+  <Edit>DocumentLibraryForm</Edit>
+  <New>DocumentLibraryForm</New>
+</FormTemplates>
+</file>
+
+<file path=customXml/item3.xml><?xml version="1.0" encoding="utf-8"?>
 <ct:contentTypeSchema xmlns:ct="http://schemas.microsoft.com/office/2006/metadata/contentType" xmlns:ma="http://schemas.microsoft.com/office/2006/metadata/properties/metaAttributes" ct:_="" ma:_="" ma:contentTypeName="Document" ma:contentTypeID="0x01010079F111ED35F8CC479449609E8A0923A6" ma:contentTypeVersion="27" ma:contentTypeDescription="Create a new document." ma:contentTypeScope="" ma:versionID="c6f9a84f66a9c8b9a21755b9ffafb945">
   <xsd:schema xmlns:xsd="http://www.w3.org/2001/XMLSchema" xmlns:xs="http://www.w3.org/2001/XMLSchema" xmlns:p="http://schemas.microsoft.com/office/2006/metadata/properties" xmlns:ns1="http://schemas.microsoft.com/sharepoint/v3" xmlns:ns2="71af3243-3dd4-4a8d-8c0d-dd76da1f02a5" xmlns:ns3="16c05727-aa75-4e4a-9b5f-8a80a1165891" xmlns:ns4="230e9df3-be65-4c73-a93b-d1236ebd677e" targetNamespace="http://schemas.microsoft.com/office/2006/metadata/properties" ma:root="true" ma:fieldsID="27df39e3e7036dff54f89ddd5805ce72" ns1:_="" ns2:_="" ns3:_="" ns4:_="">
     <xsd:import namespace="http://schemas.microsoft.com/sharepoint/v3"/>
@@ -8236,15 +9370,6 @@
 </ct:contentTypeSchema>
 </file>
 
-<file path=customXml/item3.xml><?xml version="1.0" encoding="utf-8"?>
-<?mso-contentType ?>
-<FormTemplates xmlns="http://schemas.microsoft.com/sharepoint/v3/contenttype/forms">
-  <Display>DocumentLibraryForm</Display>
-  <Edit>DocumentLibraryForm</Edit>
-  <New>DocumentLibraryForm</New>
-</FormTemplates>
-</file>
-
 <file path=customXml/itemProps1.xml><?xml version="1.0" encoding="utf-8"?>
 <ds:datastoreItem xmlns:ds="http://schemas.openxmlformats.org/officeDocument/2006/customXml" ds:itemID="{3791575F-4C21-47C4-8D13-EB9BE66B536F}">
   <ds:schemaRefs>
@@ -8258,6 +9383,14 @@
 </file>
 
 <file path=customXml/itemProps2.xml><?xml version="1.0" encoding="utf-8"?>
+<ds:datastoreItem xmlns:ds="http://schemas.openxmlformats.org/officeDocument/2006/customXml" ds:itemID="{342D3C2F-55A5-48C0-9D5A-95C7FF0389D0}">
+  <ds:schemaRefs>
+    <ds:schemaRef ds:uri="http://schemas.microsoft.com/sharepoint/v3/contenttype/forms"/>
+  </ds:schemaRefs>
+</ds:datastoreItem>
+</file>
+
+<file path=customXml/itemProps3.xml><?xml version="1.0" encoding="utf-8"?>
 <ds:datastoreItem xmlns:ds="http://schemas.openxmlformats.org/officeDocument/2006/customXml" ds:itemID="{792209EB-3212-4116-B574-D1F56C7C4922}">
   <ds:schemaRefs>
     <ds:schemaRef ds:uri="http://schemas.microsoft.com/office/2006/metadata/contentType"/>
@@ -8276,12 +9409,4 @@
     <ds:schemaRef ds:uri="http://schemas.microsoft.com/internal/obd"/>
   </ds:schemaRefs>
 </ds:datastoreItem>
-</file>
-
-<file path=customXml/itemProps3.xml><?xml version="1.0" encoding="utf-8"?>
-<ds:datastoreItem xmlns:ds="http://schemas.openxmlformats.org/officeDocument/2006/customXml" ds:itemID="{342D3C2F-55A5-48C0-9D5A-95C7FF0389D0}">
-  <ds:schemaRefs>
-    <ds:schemaRef ds:uri="http://schemas.microsoft.com/sharepoint/v3/contenttype/forms"/>
-  </ds:schemaRefs>
-</ds:datastoreItem>
 </file>
</xml_diff>

<commit_message>
melhorias aplicadas boas praticas java
</commit_message>
<xml_diff>
--- a/docs/Notifications App.pptx
+++ b/docs/Notifications App.pptx
@@ -219,7 +219,7 @@
           <a:p>
             <a:fld id="{AF869721-F543-4A6C-BF9D-65D7CC540427}" type="datetimeFigureOut">
               <a:rPr lang="en-US" smtClean="0"/>
-              <a:t>5/19/2024</a:t>
+              <a:t>5/20/2024</a:t>
             </a:fld>
             <a:endParaRPr lang="en-US" dirty="0"/>
           </a:p>
@@ -396,7 +396,7 @@
           <a:p>
             <a:fld id="{C732326A-4C88-4AFB-AA5B-5919D81DFF5B}" type="datetimeFigureOut">
               <a:rPr lang="en-US" smtClean="0"/>
-              <a:t>5/19/2024</a:t>
+              <a:t>5/20/2024</a:t>
             </a:fld>
             <a:endParaRPr lang="en-US" dirty="0"/>
           </a:p>
@@ -1077,7 +1077,7 @@
             <a:fld id="{B61BEF0D-F0BB-DE4B-95CE-6DB70DBA9567}" type="datetimeFigureOut">
               <a:rPr lang="en-US" smtClean="0"/>
               <a:pPr/>
-              <a:t>5/19/2024</a:t>
+              <a:t>5/20/2024</a:t>
             </a:fld>
             <a:endParaRPr lang="en-US" dirty="0"/>
           </a:p>
@@ -1341,7 +1341,7 @@
             <a:fld id="{B61BEF0D-F0BB-DE4B-95CE-6DB70DBA9567}" type="datetimeFigureOut">
               <a:rPr lang="en-US" smtClean="0"/>
               <a:pPr/>
-              <a:t>5/19/2024</a:t>
+              <a:t>5/20/2024</a:t>
             </a:fld>
             <a:endParaRPr lang="en-US" dirty="0"/>
           </a:p>
@@ -1578,7 +1578,7 @@
             <a:fld id="{B61BEF0D-F0BB-DE4B-95CE-6DB70DBA9567}" type="datetimeFigureOut">
               <a:rPr lang="en-US" smtClean="0"/>
               <a:pPr/>
-              <a:t>5/19/2024</a:t>
+              <a:t>5/20/2024</a:t>
             </a:fld>
             <a:endParaRPr lang="en-US" dirty="0"/>
           </a:p>
@@ -1820,7 +1820,7 @@
             <a:fld id="{B61BEF0D-F0BB-DE4B-95CE-6DB70DBA9567}" type="datetimeFigureOut">
               <a:rPr lang="en-US" smtClean="0"/>
               <a:pPr/>
-              <a:t>5/19/2024</a:t>
+              <a:t>5/20/2024</a:t>
             </a:fld>
             <a:endParaRPr lang="en-US" dirty="0"/>
           </a:p>
@@ -2129,7 +2129,7 @@
             <a:fld id="{B61BEF0D-F0BB-DE4B-95CE-6DB70DBA9567}" type="datetimeFigureOut">
               <a:rPr lang="en-US" smtClean="0"/>
               <a:pPr/>
-              <a:t>5/19/2024</a:t>
+              <a:t>5/20/2024</a:t>
             </a:fld>
             <a:endParaRPr lang="en-US" dirty="0"/>
           </a:p>
@@ -2433,7 +2433,7 @@
             <a:fld id="{B61BEF0D-F0BB-DE4B-95CE-6DB70DBA9567}" type="datetimeFigureOut">
               <a:rPr lang="en-US" smtClean="0"/>
               <a:pPr/>
-              <a:t>5/19/2024</a:t>
+              <a:t>5/20/2024</a:t>
             </a:fld>
             <a:endParaRPr lang="en-US" dirty="0"/>
           </a:p>
@@ -2857,7 +2857,7 @@
             <a:fld id="{B61BEF0D-F0BB-DE4B-95CE-6DB70DBA9567}" type="datetimeFigureOut">
               <a:rPr lang="en-US" smtClean="0"/>
               <a:pPr/>
-              <a:t>5/19/2024</a:t>
+              <a:t>5/20/2024</a:t>
             </a:fld>
             <a:endParaRPr lang="en-US" dirty="0"/>
           </a:p>
@@ -2954,7 +2954,7 @@
             <a:fld id="{B61BEF0D-F0BB-DE4B-95CE-6DB70DBA9567}" type="datetimeFigureOut">
               <a:rPr lang="en-US" smtClean="0"/>
               <a:pPr/>
-              <a:t>5/19/2024</a:t>
+              <a:t>5/20/2024</a:t>
             </a:fld>
             <a:endParaRPr lang="en-US" dirty="0"/>
           </a:p>
@@ -3118,7 +3118,7 @@
             <a:fld id="{B61BEF0D-F0BB-DE4B-95CE-6DB70DBA9567}" type="datetimeFigureOut">
               <a:rPr lang="en-US" smtClean="0"/>
               <a:pPr/>
-              <a:t>5/19/2024</a:t>
+              <a:t>5/20/2024</a:t>
             </a:fld>
             <a:endParaRPr lang="en-US" dirty="0"/>
           </a:p>
@@ -3498,7 +3498,7 @@
             <a:fld id="{B61BEF0D-F0BB-DE4B-95CE-6DB70DBA9567}" type="datetimeFigureOut">
               <a:rPr lang="en-US" smtClean="0"/>
               <a:pPr/>
-              <a:t>5/19/2024</a:t>
+              <a:t>5/20/2024</a:t>
             </a:fld>
             <a:endParaRPr lang="en-US" dirty="0"/>
           </a:p>
@@ -3789,7 +3789,7 @@
             <a:fld id="{B61BEF0D-F0BB-DE4B-95CE-6DB70DBA9567}" type="datetimeFigureOut">
               <a:rPr lang="en-US" smtClean="0"/>
               <a:pPr/>
-              <a:t>5/19/2024</a:t>
+              <a:t>5/20/2024</a:t>
             </a:fld>
             <a:endParaRPr lang="en-US" dirty="0"/>
           </a:p>
@@ -4002,7 +4002,7 @@
             <a:fld id="{B61BEF0D-F0BB-DE4B-95CE-6DB70DBA9567}" type="datetimeFigureOut">
               <a:rPr lang="en-US" smtClean="0"/>
               <a:pPr/>
-              <a:t>5/19/2024</a:t>
+              <a:t>5/20/2024</a:t>
             </a:fld>
             <a:endParaRPr lang="en-US" dirty="0"/>
           </a:p>
@@ -5859,6 +5859,42 @@
           </p:txBody>
         </p:sp>
       </p:grpSp>
+      <p:sp>
+        <p:nvSpPr>
+          <p:cNvPr id="2" name="CaixaDeTexto 1">
+            <a:extLst>
+              <a:ext uri="{FF2B5EF4-FFF2-40B4-BE49-F238E27FC236}">
+                <a16:creationId xmlns:a16="http://schemas.microsoft.com/office/drawing/2014/main" id="{9482690A-DD1A-54C6-FBD9-C82100ED0FF9}"/>
+              </a:ext>
+            </a:extLst>
+          </p:cNvPr>
+          <p:cNvSpPr txBox="1"/>
+          <p:nvPr/>
+        </p:nvSpPr>
+        <p:spPr>
+          <a:xfrm>
+            <a:off x="1946859" y="6210065"/>
+            <a:ext cx="3123578" cy="369332"/>
+          </a:xfrm>
+          <a:prstGeom prst="rect">
+            <a:avLst/>
+          </a:prstGeom>
+          <a:noFill/>
+        </p:spPr>
+        <p:txBody>
+          <a:bodyPr wrap="square" rtlCol="0">
+            <a:spAutoFit/>
+          </a:bodyPr>
+          <a:lstStyle/>
+          <a:p>
+            <a:r>
+              <a:rPr lang="pt-BR" dirty="0"/>
+              <a:t>Network em comum</a:t>
+            </a:r>
+            <a:endParaRPr lang="en-US" dirty="0"/>
+          </a:p>
+        </p:txBody>
+      </p:sp>
     </p:spTree>
     <p:extLst>
       <p:ext uri="{BB962C8B-B14F-4D97-AF65-F5344CB8AC3E}">
@@ -9056,15 +9092,6 @@
 </file>
 
 <file path=customXml/item2.xml><?xml version="1.0" encoding="utf-8"?>
-<?mso-contentType ?>
-<FormTemplates xmlns="http://schemas.microsoft.com/sharepoint/v3/contenttype/forms">
-  <Display>DocumentLibraryForm</Display>
-  <Edit>DocumentLibraryForm</Edit>
-  <New>DocumentLibraryForm</New>
-</FormTemplates>
-</file>
-
-<file path=customXml/item3.xml><?xml version="1.0" encoding="utf-8"?>
 <ct:contentTypeSchema xmlns:ct="http://schemas.microsoft.com/office/2006/metadata/contentType" xmlns:ma="http://schemas.microsoft.com/office/2006/metadata/properties/metaAttributes" ct:_="" ma:_="" ma:contentTypeName="Document" ma:contentTypeID="0x01010079F111ED35F8CC479449609E8A0923A6" ma:contentTypeVersion="27" ma:contentTypeDescription="Create a new document." ma:contentTypeScope="" ma:versionID="c6f9a84f66a9c8b9a21755b9ffafb945">
   <xsd:schema xmlns:xsd="http://www.w3.org/2001/XMLSchema" xmlns:xs="http://www.w3.org/2001/XMLSchema" xmlns:p="http://schemas.microsoft.com/office/2006/metadata/properties" xmlns:ns1="http://schemas.microsoft.com/sharepoint/v3" xmlns:ns2="71af3243-3dd4-4a8d-8c0d-dd76da1f02a5" xmlns:ns3="16c05727-aa75-4e4a-9b5f-8a80a1165891" xmlns:ns4="230e9df3-be65-4c73-a93b-d1236ebd677e" targetNamespace="http://schemas.microsoft.com/office/2006/metadata/properties" ma:root="true" ma:fieldsID="27df39e3e7036dff54f89ddd5805ce72" ns1:_="" ns2:_="" ns3:_="" ns4:_="">
     <xsd:import namespace="http://schemas.microsoft.com/sharepoint/v3"/>
@@ -9370,6 +9397,15 @@
 </ct:contentTypeSchema>
 </file>
 
+<file path=customXml/item3.xml><?xml version="1.0" encoding="utf-8"?>
+<?mso-contentType ?>
+<FormTemplates xmlns="http://schemas.microsoft.com/sharepoint/v3/contenttype/forms">
+  <Display>DocumentLibraryForm</Display>
+  <Edit>DocumentLibraryForm</Edit>
+  <New>DocumentLibraryForm</New>
+</FormTemplates>
+</file>
+
 <file path=customXml/itemProps1.xml><?xml version="1.0" encoding="utf-8"?>
 <ds:datastoreItem xmlns:ds="http://schemas.openxmlformats.org/officeDocument/2006/customXml" ds:itemID="{3791575F-4C21-47C4-8D13-EB9BE66B536F}">
   <ds:schemaRefs>
@@ -9383,14 +9419,6 @@
 </file>
 
 <file path=customXml/itemProps2.xml><?xml version="1.0" encoding="utf-8"?>
-<ds:datastoreItem xmlns:ds="http://schemas.openxmlformats.org/officeDocument/2006/customXml" ds:itemID="{342D3C2F-55A5-48C0-9D5A-95C7FF0389D0}">
-  <ds:schemaRefs>
-    <ds:schemaRef ds:uri="http://schemas.microsoft.com/sharepoint/v3/contenttype/forms"/>
-  </ds:schemaRefs>
-</ds:datastoreItem>
-</file>
-
-<file path=customXml/itemProps3.xml><?xml version="1.0" encoding="utf-8"?>
 <ds:datastoreItem xmlns:ds="http://schemas.openxmlformats.org/officeDocument/2006/customXml" ds:itemID="{792209EB-3212-4116-B574-D1F56C7C4922}">
   <ds:schemaRefs>
     <ds:schemaRef ds:uri="http://schemas.microsoft.com/office/2006/metadata/contentType"/>
@@ -9409,4 +9437,12 @@
     <ds:schemaRef ds:uri="http://schemas.microsoft.com/internal/obd"/>
   </ds:schemaRefs>
 </ds:datastoreItem>
+</file>
+
+<file path=customXml/itemProps3.xml><?xml version="1.0" encoding="utf-8"?>
+<ds:datastoreItem xmlns:ds="http://schemas.openxmlformats.org/officeDocument/2006/customXml" ds:itemID="{342D3C2F-55A5-48C0-9D5A-95C7FF0389D0}">
+  <ds:schemaRefs>
+    <ds:schemaRef ds:uri="http://schemas.microsoft.com/sharepoint/v3/contenttype/forms"/>
+  </ds:schemaRefs>
+</ds:datastoreItem>
 </file>
</xml_diff>